<commit_message>
submit Testcase Manage Banners
</commit_message>
<xml_diff>
--- a/1.DELIVERABLE/1.11 EOMP#/EOMP#2/EOMP2.pptx
+++ b/1.DELIVERABLE/1.11 EOMP#/EOMP#2/EOMP2.pptx
@@ -5,7 +5,7 @@
     <p:sldMasterId id="2147483771" r:id="rId1"/>
   </p:sldMasterIdLst>
   <p:notesMasterIdLst>
-    <p:notesMasterId r:id="rId27"/>
+    <p:notesMasterId r:id="rId26"/>
   </p:notesMasterIdLst>
   <p:sldIdLst>
     <p:sldId id="256" r:id="rId2"/>
@@ -24,15 +24,14 @@
     <p:sldId id="281" r:id="rId15"/>
     <p:sldId id="279" r:id="rId16"/>
     <p:sldId id="283" r:id="rId17"/>
-    <p:sldId id="286" r:id="rId18"/>
-    <p:sldId id="269" r:id="rId19"/>
-    <p:sldId id="262" r:id="rId20"/>
-    <p:sldId id="267" r:id="rId21"/>
-    <p:sldId id="294" r:id="rId22"/>
-    <p:sldId id="293" r:id="rId23"/>
-    <p:sldId id="271" r:id="rId24"/>
-    <p:sldId id="287" r:id="rId25"/>
-    <p:sldId id="272" r:id="rId26"/>
+    <p:sldId id="269" r:id="rId18"/>
+    <p:sldId id="262" r:id="rId19"/>
+    <p:sldId id="267" r:id="rId20"/>
+    <p:sldId id="294" r:id="rId21"/>
+    <p:sldId id="293" r:id="rId22"/>
+    <p:sldId id="271" r:id="rId23"/>
+    <p:sldId id="287" r:id="rId24"/>
+    <p:sldId id="272" r:id="rId25"/>
   </p:sldIdLst>
   <p:sldSz cx="12192000" cy="6858000"/>
   <p:notesSz cx="6858000" cy="9144000"/>
@@ -133,14 +132,14 @@
   </p:defaultTextStyle>
   <p:extLst>
     <p:ext uri="{EFAFB233-063F-42B5-8137-9DF3F51BA10A}">
-      <p15:sldGuideLst xmlns:p15="http://schemas.microsoft.com/office/powerpoint/2012/main"/>
+      <p15:sldGuideLst xmlns:p15="http://schemas.microsoft.com/office/powerpoint/2012/main" xmlns=""/>
     </p:ext>
   </p:extLst>
 </p:presentation>
 </file>
 
 <file path=ppt/charts/chart1.xml><?xml version="1.0" encoding="utf-8"?>
-<c:chartSpace xmlns:c="http://schemas.openxmlformats.org/drawingml/2006/chart" xmlns:a="http://schemas.openxmlformats.org/drawingml/2006/main" xmlns:r="http://schemas.openxmlformats.org/officeDocument/2006/relationships" xmlns:c16r2="http://schemas.microsoft.com/office/drawing/2015/06/chart">
+<c:chartSpace xmlns:c="http://schemas.openxmlformats.org/drawingml/2006/chart" xmlns:a="http://schemas.openxmlformats.org/drawingml/2006/main" xmlns:r="http://schemas.openxmlformats.org/officeDocument/2006/relationships">
   <c:date1904 val="0"/>
   <c:lang val="en-US"/>
   <c:roundedCorners val="0"/>
@@ -180,6 +179,7 @@
           </a:p>
         </c:rich>
       </c:tx>
+      <c:layout/>
       <c:overlay val="0"/>
       <c:spPr>
         <a:noFill/>
@@ -188,26 +188,6 @@
         </a:ln>
         <a:effectLst/>
       </c:spPr>
-      <c:txPr>
-        <a:bodyPr rot="0" spcFirstLastPara="1" vertOverflow="ellipsis" vert="horz" wrap="square" anchor="ctr" anchorCtr="1"/>
-        <a:lstStyle/>
-        <a:p>
-          <a:pPr>
-            <a:defRPr sz="2128" b="1" i="0" u="none" strike="noStrike" kern="1200" cap="none" spc="0" normalizeH="0" baseline="0">
-              <a:solidFill>
-                <a:schemeClr val="dk1">
-                  <a:lumMod val="50000"/>
-                  <a:lumOff val="50000"/>
-                </a:schemeClr>
-              </a:solidFill>
-              <a:latin typeface="+mj-lt"/>
-              <a:ea typeface="+mj-ea"/>
-              <a:cs typeface="+mj-cs"/>
-            </a:defRPr>
-          </a:pPr>
-          <a:endParaRPr lang="vi-VN"/>
-        </a:p>
-      </c:txPr>
     </c:title>
     <c:autoTitleDeleted val="0"/>
     <c:plotArea>
@@ -457,7 +437,7 @@
             </c:numRef>
           </c:val>
           <c:smooth val="0"/>
-          <c:extLst>
+          <c:extLst xmlns:c16r2="http://schemas.microsoft.com/office/drawing/2015/06/chart">
             <c:ext xmlns:c16="http://schemas.microsoft.com/office/drawing/2014/chart" uri="{C3380CC4-5D6E-409C-BE32-E72D297353CC}">
               <c16:uniqueId val="{00000000-D288-4EFD-AE7D-C22BCBDA3A29}"/>
             </c:ext>
@@ -675,7 +655,7 @@
             </c:numRef>
           </c:val>
           <c:smooth val="0"/>
-          <c:extLst>
+          <c:extLst xmlns:c16r2="http://schemas.microsoft.com/office/drawing/2015/06/chart">
             <c:ext xmlns:c16="http://schemas.microsoft.com/office/drawing/2014/chart" uri="{C3380CC4-5D6E-409C-BE32-E72D297353CC}">
               <c16:uniqueId val="{00000001-D288-4EFD-AE7D-C22BCBDA3A29}"/>
             </c:ext>
@@ -941,7 +921,7 @@
             </c:numRef>
           </c:val>
           <c:smooth val="0"/>
-          <c:extLst>
+          <c:extLst xmlns:c16r2="http://schemas.microsoft.com/office/drawing/2015/06/chart">
             <c:ext xmlns:c16="http://schemas.microsoft.com/office/drawing/2014/chart" uri="{C3380CC4-5D6E-409C-BE32-E72D297353CC}">
               <c16:uniqueId val="{00000002-D288-4EFD-AE7D-C22BCBDA3A29}"/>
             </c:ext>
@@ -955,12 +935,13 @@
           <c:showPercent val="0"/>
           <c:showBubbleSize val="0"/>
         </c:dLbls>
+        <c:marker val="1"/>
         <c:smooth val="0"/>
-        <c:axId val="-1894721120"/>
-        <c:axId val="-1894720576"/>
+        <c:axId val="97561216"/>
+        <c:axId val="97567104"/>
       </c:lineChart>
       <c:catAx>
-        <c:axId val="-1894721120"/>
+        <c:axId val="97561216"/>
         <c:scaling>
           <c:orientation val="minMax"/>
         </c:scaling>
@@ -1030,10 +1011,10 @@
                 <a:cs typeface="+mn-cs"/>
               </a:defRPr>
             </a:pPr>
-            <a:endParaRPr lang="vi-VN"/>
+            <a:endParaRPr lang="en-US"/>
           </a:p>
         </c:txPr>
-        <c:crossAx val="-1894720576"/>
+        <c:crossAx val="97567104"/>
         <c:crosses val="autoZero"/>
         <c:auto val="1"/>
         <c:lblAlgn val="ctr"/>
@@ -1041,7 +1022,7 @@
         <c:noMultiLvlLbl val="0"/>
       </c:catAx>
       <c:valAx>
-        <c:axId val="-1894720576"/>
+        <c:axId val="97567104"/>
         <c:scaling>
           <c:orientation val="minMax"/>
         </c:scaling>
@@ -1090,10 +1071,10 @@
                 <a:cs typeface="+mn-cs"/>
               </a:defRPr>
             </a:pPr>
-            <a:endParaRPr lang="vi-VN"/>
+            <a:endParaRPr lang="en-US"/>
           </a:p>
         </c:txPr>
-        <c:crossAx val="-1894721120"/>
+        <c:crossAx val="97561216"/>
         <c:crosses val="autoZero"/>
         <c:crossBetween val="between"/>
         <c:majorUnit val="1000"/>
@@ -1119,6 +1100,7 @@
     </c:plotArea>
     <c:legend>
       <c:legendPos val="b"/>
+      <c:layout/>
       <c:overlay val="0"/>
       <c:spPr>
         <a:noFill/>
@@ -1144,7 +1126,7 @@
               <a:cs typeface="+mn-cs"/>
             </a:defRPr>
           </a:pPr>
-          <a:endParaRPr lang="vi-VN"/>
+          <a:endParaRPr lang="en-US"/>
         </a:p>
       </c:txPr>
     </c:legend>
@@ -1174,18 +1156,18 @@
       <a:pPr>
         <a:defRPr/>
       </a:pPr>
-      <a:endParaRPr lang="vi-VN"/>
+      <a:endParaRPr lang="en-US"/>
     </a:p>
   </c:txPr>
-  <c:externalData r:id="rId3">
+  <c:externalData r:id="rId1">
     <c:autoUpdate val="0"/>
   </c:externalData>
-  <c:userShapes r:id="rId4"/>
+  <c:userShapes r:id="rId2"/>
 </c:chartSpace>
 </file>
 
 <file path=ppt/charts/chart2.xml><?xml version="1.0" encoding="utf-8"?>
-<c:chartSpace xmlns:c="http://schemas.openxmlformats.org/drawingml/2006/chart" xmlns:a="http://schemas.openxmlformats.org/drawingml/2006/main" xmlns:r="http://schemas.openxmlformats.org/officeDocument/2006/relationships" xmlns:c16r2="http://schemas.microsoft.com/office/drawing/2015/06/chart">
+<c:chartSpace xmlns:c="http://schemas.openxmlformats.org/drawingml/2006/chart" xmlns:a="http://schemas.openxmlformats.org/drawingml/2006/main" xmlns:r="http://schemas.openxmlformats.org/officeDocument/2006/relationships">
   <c:date1904 val="0"/>
   <c:lang val="en-US"/>
   <c:roundedCorners val="0"/>
@@ -1224,6 +1206,7 @@
           </a:p>
         </c:rich>
       </c:tx>
+      <c:layout/>
       <c:overlay val="0"/>
       <c:spPr>
         <a:noFill/>
@@ -1232,26 +1215,6 @@
         </a:ln>
         <a:effectLst/>
       </c:spPr>
-      <c:txPr>
-        <a:bodyPr rot="0" spcFirstLastPara="1" vertOverflow="ellipsis" vert="horz" wrap="square" anchor="ctr" anchorCtr="1"/>
-        <a:lstStyle/>
-        <a:p>
-          <a:pPr>
-            <a:defRPr sz="2128" b="1" i="0" u="none" strike="noStrike" kern="1200" cap="none" spc="0" normalizeH="0" baseline="0">
-              <a:solidFill>
-                <a:schemeClr val="dk1">
-                  <a:lumMod val="50000"/>
-                  <a:lumOff val="50000"/>
-                </a:schemeClr>
-              </a:solidFill>
-              <a:latin typeface="+mj-lt"/>
-              <a:ea typeface="+mj-ea"/>
-              <a:cs typeface="+mj-cs"/>
-            </a:defRPr>
-          </a:pPr>
-          <a:endParaRPr lang="vi-VN"/>
-        </a:p>
-      </c:txPr>
     </c:title>
     <c:autoTitleDeleted val="0"/>
     <c:plotArea>
@@ -1291,24 +1254,8 @@
           </c:marker>
           <c:dPt>
             <c:idx val="19"/>
-            <c:marker>
-              <c:symbol val="diamond"/>
-              <c:size val="6"/>
-              <c:spPr>
-                <a:solidFill>
-                  <a:schemeClr val="lt1"/>
-                </a:solidFill>
-                <a:ln w="15875">
-                  <a:solidFill>
-                    <a:schemeClr val="accent1"/>
-                  </a:solidFill>
-                  <a:round/>
-                </a:ln>
-                <a:effectLst/>
-              </c:spPr>
-            </c:marker>
             <c:bubble3D val="0"/>
-            <c:extLst>
+            <c:extLst xmlns:c16r2="http://schemas.microsoft.com/office/drawing/2015/06/chart">
               <c:ext xmlns:c16="http://schemas.microsoft.com/office/drawing/2014/chart" uri="{C3380CC4-5D6E-409C-BE32-E72D297353CC}">
                 <c16:uniqueId val="{00000000-9CBB-4794-8149-4EF5A50D49CE}"/>
               </c:ext>
@@ -1453,7 +1400,7 @@
             </c:numRef>
           </c:yVal>
           <c:smooth val="0"/>
-          <c:extLst>
+          <c:extLst xmlns:c16r2="http://schemas.microsoft.com/office/drawing/2015/06/chart">
             <c:ext xmlns:c16="http://schemas.microsoft.com/office/drawing/2014/chart" uri="{C3380CC4-5D6E-409C-BE32-E72D297353CC}">
               <c16:uniqueId val="{00000001-9CBB-4794-8149-4EF5A50D49CE}"/>
             </c:ext>
@@ -1467,11 +1414,11 @@
           <c:showPercent val="0"/>
           <c:showBubbleSize val="0"/>
         </c:dLbls>
-        <c:axId val="-1634561312"/>
-        <c:axId val="-1634550432"/>
+        <c:axId val="99302016"/>
+        <c:axId val="99304192"/>
       </c:scatterChart>
       <c:valAx>
-        <c:axId val="-1634561312"/>
+        <c:axId val="99302016"/>
         <c:scaling>
           <c:orientation val="minMax"/>
           <c:max val="1.1000000000000001"/>
@@ -1520,6 +1467,7 @@
               </a:p>
             </c:rich>
           </c:tx>
+          <c:layout/>
           <c:overlay val="0"/>
           <c:spPr>
             <a:noFill/>
@@ -1528,26 +1476,6 @@
             </a:ln>
             <a:effectLst/>
           </c:spPr>
-          <c:txPr>
-            <a:bodyPr rot="0" spcFirstLastPara="1" vertOverflow="ellipsis" vert="horz" wrap="square" anchor="ctr" anchorCtr="1"/>
-            <a:lstStyle/>
-            <a:p>
-              <a:pPr>
-                <a:defRPr sz="1197" b="1" i="0" u="none" strike="noStrike" kern="1200" baseline="0">
-                  <a:solidFill>
-                    <a:schemeClr val="dk1">
-                      <a:lumMod val="65000"/>
-                      <a:lumOff val="35000"/>
-                    </a:schemeClr>
-                  </a:solidFill>
-                  <a:latin typeface="+mn-lt"/>
-                  <a:ea typeface="+mn-ea"/>
-                  <a:cs typeface="+mn-cs"/>
-                </a:defRPr>
-              </a:pPr>
-              <a:endParaRPr lang="vi-VN"/>
-            </a:p>
-          </c:txPr>
         </c:title>
         <c:numFmt formatCode="General" sourceLinked="1"/>
         <c:majorTickMark val="none"/>
@@ -1584,15 +1512,15 @@
                 <a:cs typeface="+mn-cs"/>
               </a:defRPr>
             </a:pPr>
-            <a:endParaRPr lang="vi-VN"/>
+            <a:endParaRPr lang="en-US"/>
           </a:p>
         </c:txPr>
-        <c:crossAx val="-1634550432"/>
+        <c:crossAx val="99304192"/>
         <c:crosses val="autoZero"/>
         <c:crossBetween val="midCat"/>
       </c:valAx>
       <c:valAx>
-        <c:axId val="-1634550432"/>
+        <c:axId val="99304192"/>
         <c:scaling>
           <c:orientation val="minMax"/>
           <c:max val="1.1000000000000001"/>
@@ -1641,6 +1569,7 @@
               </a:p>
             </c:rich>
           </c:tx>
+          <c:layout/>
           <c:overlay val="0"/>
           <c:spPr>
             <a:noFill/>
@@ -1649,26 +1578,6 @@
             </a:ln>
             <a:effectLst/>
           </c:spPr>
-          <c:txPr>
-            <a:bodyPr rot="-5400000" spcFirstLastPara="1" vertOverflow="ellipsis" vert="horz" wrap="square" anchor="ctr" anchorCtr="1"/>
-            <a:lstStyle/>
-            <a:p>
-              <a:pPr>
-                <a:defRPr sz="1197" b="1" i="0" u="none" strike="noStrike" kern="1200" baseline="0">
-                  <a:solidFill>
-                    <a:schemeClr val="dk1">
-                      <a:lumMod val="65000"/>
-                      <a:lumOff val="35000"/>
-                    </a:schemeClr>
-                  </a:solidFill>
-                  <a:latin typeface="+mn-lt"/>
-                  <a:ea typeface="+mn-ea"/>
-                  <a:cs typeface="+mn-cs"/>
-                </a:defRPr>
-              </a:pPr>
-              <a:endParaRPr lang="vi-VN"/>
-            </a:p>
-          </c:txPr>
         </c:title>
         <c:numFmt formatCode="General" sourceLinked="1"/>
         <c:majorTickMark val="none"/>
@@ -1705,10 +1614,10 @@
                 <a:cs typeface="+mn-cs"/>
               </a:defRPr>
             </a:pPr>
-            <a:endParaRPr lang="vi-VN"/>
+            <a:endParaRPr lang="en-US"/>
           </a:p>
         </c:txPr>
-        <c:crossAx val="-1634561312"/>
+        <c:crossAx val="99302016"/>
         <c:crosses val="autoZero"/>
         <c:crossBetween val="midCat"/>
       </c:valAx>
@@ -1756,18 +1665,18 @@
       <a:pPr>
         <a:defRPr/>
       </a:pPr>
-      <a:endParaRPr lang="vi-VN"/>
+      <a:endParaRPr lang="en-US"/>
     </a:p>
   </c:txPr>
-  <c:externalData r:id="rId3">
+  <c:externalData r:id="rId1">
     <c:autoUpdate val="0"/>
   </c:externalData>
-  <c:userShapes r:id="rId4"/>
+  <c:userShapes r:id="rId2"/>
 </c:chartSpace>
 </file>
 
 <file path=ppt/charts/chart3.xml><?xml version="1.0" encoding="utf-8"?>
-<c:chartSpace xmlns:c="http://schemas.openxmlformats.org/drawingml/2006/chart" xmlns:a="http://schemas.openxmlformats.org/drawingml/2006/main" xmlns:r="http://schemas.openxmlformats.org/officeDocument/2006/relationships" xmlns:c16r2="http://schemas.microsoft.com/office/drawing/2015/06/chart">
+<c:chartSpace xmlns:c="http://schemas.openxmlformats.org/drawingml/2006/chart" xmlns:a="http://schemas.openxmlformats.org/drawingml/2006/main" xmlns:r="http://schemas.openxmlformats.org/officeDocument/2006/relationships">
   <c:date1904 val="0"/>
   <c:lang val="en-US"/>
   <c:roundedCorners val="0"/>
@@ -1807,6 +1716,7 @@
           </a:p>
         </c:rich>
       </c:tx>
+      <c:layout/>
       <c:overlay val="0"/>
       <c:spPr>
         <a:noFill/>
@@ -1815,26 +1725,6 @@
         </a:ln>
         <a:effectLst/>
       </c:spPr>
-      <c:txPr>
-        <a:bodyPr rot="0" spcFirstLastPara="1" vertOverflow="ellipsis" vert="horz" wrap="square" anchor="ctr" anchorCtr="1"/>
-        <a:lstStyle/>
-        <a:p>
-          <a:pPr>
-            <a:defRPr sz="2200" b="1" i="0" u="none" strike="noStrike" kern="1200" baseline="0">
-              <a:solidFill>
-                <a:schemeClr val="dk1">
-                  <a:lumMod val="65000"/>
-                  <a:lumOff val="35000"/>
-                </a:schemeClr>
-              </a:solidFill>
-              <a:latin typeface="+mn-lt"/>
-              <a:ea typeface="+mn-ea"/>
-              <a:cs typeface="+mn-cs"/>
-            </a:defRPr>
-          </a:pPr>
-          <a:endParaRPr lang="vi-VN"/>
-        </a:p>
-      </c:txPr>
     </c:title>
     <c:autoTitleDeleted val="0"/>
     <c:plotArea>
@@ -1862,7 +1752,7 @@
                 </a:outerShdw>
               </a:effectLst>
             </c:spPr>
-            <c:extLst>
+            <c:extLst xmlns:c16r2="http://schemas.microsoft.com/office/drawing/2015/06/chart">
               <c:ext xmlns:c16="http://schemas.microsoft.com/office/drawing/2014/chart" uri="{C3380CC4-5D6E-409C-BE32-E72D297353CC}">
                 <c16:uniqueId val="{00000001-AB92-4286-BE25-F10D9F860D32}"/>
               </c:ext>
@@ -1886,7 +1776,7 @@
                 </a:outerShdw>
               </a:effectLst>
             </c:spPr>
-            <c:extLst>
+            <c:extLst xmlns:c16r2="http://schemas.microsoft.com/office/drawing/2015/06/chart">
               <c:ext xmlns:c16="http://schemas.microsoft.com/office/drawing/2014/chart" uri="{C3380CC4-5D6E-409C-BE32-E72D297353CC}">
                 <c16:uniqueId val="{00000003-AB92-4286-BE25-F10D9F860D32}"/>
               </c:ext>
@@ -1910,7 +1800,7 @@
                 </a:outerShdw>
               </a:effectLst>
             </c:spPr>
-            <c:extLst>
+            <c:extLst xmlns:c16r2="http://schemas.microsoft.com/office/drawing/2015/06/chart">
               <c:ext xmlns:c16="http://schemas.microsoft.com/office/drawing/2014/chart" uri="{C3380CC4-5D6E-409C-BE32-E72D297353CC}">
                 <c16:uniqueId val="{00000005-AB92-4286-BE25-F10D9F860D32}"/>
               </c:ext>
@@ -1940,7 +1830,7 @@
                     <a:cs typeface="+mn-cs"/>
                   </a:defRPr>
                 </a:pPr>
-                <a:endParaRPr lang="vi-VN"/>
+                <a:endParaRPr lang="en-US"/>
               </a:p>
             </c:txPr>
             <c:dLblPos val="inEnd"/>
@@ -1965,7 +1855,7 @@
                 <a:effectLst/>
               </c:spPr>
             </c:leaderLines>
-            <c:extLst>
+            <c:extLst xmlns:c16r2="http://schemas.microsoft.com/office/drawing/2015/06/chart">
               <c:ext xmlns:c15="http://schemas.microsoft.com/office/drawing/2012/chart" uri="{CE6537A1-D6FC-4f65-9D91-7224C49458BB}"/>
             </c:extLst>
           </c:dLbls>
@@ -2004,7 +1894,7 @@
               </c:numCache>
             </c:numRef>
           </c:val>
-          <c:extLst>
+          <c:extLst xmlns:c16r2="http://schemas.microsoft.com/office/drawing/2015/06/chart">
             <c:ext xmlns:c16="http://schemas.microsoft.com/office/drawing/2014/chart" uri="{C3380CC4-5D6E-409C-BE32-E72D297353CC}">
               <c16:uniqueId val="{00000006-AB92-4286-BE25-F10D9F860D32}"/>
             </c:ext>
@@ -2032,6 +1922,7 @@
     </c:plotArea>
     <c:legend>
       <c:legendPos val="b"/>
+      <c:layout/>
       <c:overlay val="0"/>
       <c:spPr>
         <a:solidFill>
@@ -2061,7 +1952,7 @@
               <a:cs typeface="+mn-cs"/>
             </a:defRPr>
           </a:pPr>
-          <a:endParaRPr lang="vi-VN"/>
+          <a:endParaRPr lang="en-US"/>
         </a:p>
       </c:txPr>
     </c:legend>
@@ -2098,17 +1989,17 @@
       <a:pPr>
         <a:defRPr/>
       </a:pPr>
-      <a:endParaRPr lang="vi-VN"/>
+      <a:endParaRPr lang="en-US"/>
     </a:p>
   </c:txPr>
-  <c:externalData r:id="rId3">
+  <c:externalData r:id="rId1">
     <c:autoUpdate val="0"/>
   </c:externalData>
 </c:chartSpace>
 </file>
 
 <file path=ppt/charts/chart4.xml><?xml version="1.0" encoding="utf-8"?>
-<c:chartSpace xmlns:c="http://schemas.openxmlformats.org/drawingml/2006/chart" xmlns:a="http://schemas.openxmlformats.org/drawingml/2006/main" xmlns:r="http://schemas.openxmlformats.org/officeDocument/2006/relationships" xmlns:c16r2="http://schemas.microsoft.com/office/drawing/2015/06/chart">
+<c:chartSpace xmlns:c="http://schemas.openxmlformats.org/drawingml/2006/chart" xmlns:a="http://schemas.openxmlformats.org/drawingml/2006/main" xmlns:r="http://schemas.openxmlformats.org/officeDocument/2006/relationships">
   <c:date1904 val="0"/>
   <c:lang val="en-US"/>
   <c:roundedCorners val="0"/>
@@ -2152,6 +2043,7 @@
           </a:p>
         </c:rich>
       </c:tx>
+      <c:layout/>
       <c:overlay val="0"/>
       <c:spPr>
         <a:noFill/>
@@ -2160,26 +2052,6 @@
         </a:ln>
         <a:effectLst/>
       </c:spPr>
-      <c:txPr>
-        <a:bodyPr rot="0" spcFirstLastPara="1" vertOverflow="ellipsis" vert="horz" wrap="square" anchor="ctr" anchorCtr="1"/>
-        <a:lstStyle/>
-        <a:p>
-          <a:pPr>
-            <a:defRPr sz="2200" b="1" i="0" u="none" strike="noStrike" kern="1200" baseline="0">
-              <a:solidFill>
-                <a:schemeClr val="dk1">
-                  <a:lumMod val="65000"/>
-                  <a:lumOff val="35000"/>
-                </a:schemeClr>
-              </a:solidFill>
-              <a:latin typeface="+mn-lt"/>
-              <a:ea typeface="+mn-ea"/>
-              <a:cs typeface="+mn-cs"/>
-            </a:defRPr>
-          </a:pPr>
-          <a:endParaRPr lang="vi-VN"/>
-        </a:p>
-      </c:txPr>
     </c:title>
     <c:autoTitleDeleted val="0"/>
     <c:plotArea>
@@ -2207,7 +2079,7 @@
                 </a:outerShdw>
               </a:effectLst>
             </c:spPr>
-            <c:extLst>
+            <c:extLst xmlns:c16r2="http://schemas.microsoft.com/office/drawing/2015/06/chart">
               <c:ext xmlns:c16="http://schemas.microsoft.com/office/drawing/2014/chart" uri="{C3380CC4-5D6E-409C-BE32-E72D297353CC}">
                 <c16:uniqueId val="{00000001-9FE3-4B85-BF7F-CA239208961F}"/>
               </c:ext>
@@ -2231,7 +2103,7 @@
                 </a:outerShdw>
               </a:effectLst>
             </c:spPr>
-            <c:extLst>
+            <c:extLst xmlns:c16r2="http://schemas.microsoft.com/office/drawing/2015/06/chart">
               <c:ext xmlns:c16="http://schemas.microsoft.com/office/drawing/2014/chart" uri="{C3380CC4-5D6E-409C-BE32-E72D297353CC}">
                 <c16:uniqueId val="{00000003-9FE3-4B85-BF7F-CA239208961F}"/>
               </c:ext>
@@ -2255,7 +2127,7 @@
                 </a:outerShdw>
               </a:effectLst>
             </c:spPr>
-            <c:extLst>
+            <c:extLst xmlns:c16r2="http://schemas.microsoft.com/office/drawing/2015/06/chart">
               <c:ext xmlns:c16="http://schemas.microsoft.com/office/drawing/2014/chart" uri="{C3380CC4-5D6E-409C-BE32-E72D297353CC}">
                 <c16:uniqueId val="{00000005-9FE3-4B85-BF7F-CA239208961F}"/>
               </c:ext>
@@ -2279,7 +2151,7 @@
                 </a:outerShdw>
               </a:effectLst>
             </c:spPr>
-            <c:extLst>
+            <c:extLst xmlns:c16r2="http://schemas.microsoft.com/office/drawing/2015/06/chart">
               <c:ext xmlns:c16="http://schemas.microsoft.com/office/drawing/2014/chart" uri="{C3380CC4-5D6E-409C-BE32-E72D297353CC}">
                 <c16:uniqueId val="{00000007-9FE3-4B85-BF7F-CA239208961F}"/>
               </c:ext>
@@ -2303,7 +2175,7 @@
                 </a:outerShdw>
               </a:effectLst>
             </c:spPr>
-            <c:extLst>
+            <c:extLst xmlns:c16r2="http://schemas.microsoft.com/office/drawing/2015/06/chart">
               <c:ext xmlns:c16="http://schemas.microsoft.com/office/drawing/2014/chart" uri="{C3380CC4-5D6E-409C-BE32-E72D297353CC}">
                 <c16:uniqueId val="{00000009-9FE3-4B85-BF7F-CA239208961F}"/>
               </c:ext>
@@ -2333,7 +2205,7 @@
                     <a:cs typeface="+mn-cs"/>
                   </a:defRPr>
                 </a:pPr>
-                <a:endParaRPr lang="vi-VN"/>
+                <a:endParaRPr lang="en-US"/>
               </a:p>
             </c:txPr>
             <c:dLblPos val="inEnd"/>
@@ -2358,7 +2230,7 @@
                 <a:effectLst/>
               </c:spPr>
             </c:leaderLines>
-            <c:extLst>
+            <c:extLst xmlns:c16r2="http://schemas.microsoft.com/office/drawing/2015/06/chart">
               <c:ext xmlns:c15="http://schemas.microsoft.com/office/drawing/2012/chart" uri="{CE6537A1-D6FC-4f65-9D91-7224C49458BB}"/>
             </c:extLst>
           </c:dLbls>
@@ -2409,7 +2281,7 @@
               </c:numCache>
             </c:numRef>
           </c:val>
-          <c:extLst>
+          <c:extLst xmlns:c16r2="http://schemas.microsoft.com/office/drawing/2015/06/chart">
             <c:ext xmlns:c16="http://schemas.microsoft.com/office/drawing/2014/chart" uri="{C3380CC4-5D6E-409C-BE32-E72D297353CC}">
               <c16:uniqueId val="{0000000A-9FE3-4B85-BF7F-CA239208961F}"/>
             </c:ext>
@@ -2437,6 +2309,7 @@
     </c:plotArea>
     <c:legend>
       <c:legendPos val="b"/>
+      <c:layout/>
       <c:overlay val="0"/>
       <c:spPr>
         <a:solidFill>
@@ -2466,7 +2339,7 @@
               <a:cs typeface="+mn-cs"/>
             </a:defRPr>
           </a:pPr>
-          <a:endParaRPr lang="vi-VN"/>
+          <a:endParaRPr lang="en-US"/>
         </a:p>
       </c:txPr>
     </c:legend>
@@ -2503,17 +2376,17 @@
       <a:pPr>
         <a:defRPr/>
       </a:pPr>
-      <a:endParaRPr lang="vi-VN"/>
+      <a:endParaRPr lang="en-US"/>
     </a:p>
   </c:txPr>
-  <c:externalData r:id="rId3">
+  <c:externalData r:id="rId1">
     <c:autoUpdate val="0"/>
   </c:externalData>
 </c:chartSpace>
 </file>
 
 <file path=ppt/charts/chart5.xml><?xml version="1.0" encoding="utf-8"?>
-<c:chartSpace xmlns:c="http://schemas.openxmlformats.org/drawingml/2006/chart" xmlns:a="http://schemas.openxmlformats.org/drawingml/2006/main" xmlns:r="http://schemas.openxmlformats.org/officeDocument/2006/relationships" xmlns:c16r2="http://schemas.microsoft.com/office/drawing/2015/06/chart">
+<c:chartSpace xmlns:c="http://schemas.openxmlformats.org/drawingml/2006/chart" xmlns:a="http://schemas.openxmlformats.org/drawingml/2006/main" xmlns:r="http://schemas.openxmlformats.org/officeDocument/2006/relationships">
   <c:date1904 val="0"/>
   <c:lang val="en-US"/>
   <c:roundedCorners val="0"/>
@@ -2553,6 +2426,7 @@
           </a:p>
         </c:rich>
       </c:tx>
+      <c:layout/>
       <c:overlay val="0"/>
       <c:spPr>
         <a:noFill/>
@@ -2561,26 +2435,6 @@
         </a:ln>
         <a:effectLst/>
       </c:spPr>
-      <c:txPr>
-        <a:bodyPr rot="0" spcFirstLastPara="1" vertOverflow="ellipsis" vert="horz" wrap="square" anchor="ctr" anchorCtr="1"/>
-        <a:lstStyle/>
-        <a:p>
-          <a:pPr>
-            <a:defRPr sz="2128" b="1" i="0" u="none" strike="noStrike" kern="1200" cap="none" spc="0" normalizeH="0" baseline="0">
-              <a:solidFill>
-                <a:schemeClr val="dk1">
-                  <a:lumMod val="50000"/>
-                  <a:lumOff val="50000"/>
-                </a:schemeClr>
-              </a:solidFill>
-              <a:latin typeface="+mj-lt"/>
-              <a:ea typeface="+mj-ea"/>
-              <a:cs typeface="+mj-cs"/>
-            </a:defRPr>
-          </a:pPr>
-          <a:endParaRPr lang="vi-VN"/>
-        </a:p>
-      </c:txPr>
     </c:title>
     <c:autoTitleDeleted val="0"/>
     <c:plotArea>
@@ -2629,7 +2483,7 @@
                     <a:cs typeface="+mn-cs"/>
                   </a:defRPr>
                 </a:pPr>
-                <a:endParaRPr lang="vi-VN"/>
+                <a:endParaRPr lang="en-US"/>
               </a:p>
             </c:txPr>
             <c:dLblPos val="inEnd"/>
@@ -2640,7 +2494,7 @@
             <c:showPercent val="0"/>
             <c:showBubbleSize val="0"/>
             <c:showLeaderLines val="0"/>
-            <c:extLst>
+            <c:extLst xmlns:c16r2="http://schemas.microsoft.com/office/drawing/2015/06/chart">
               <c:ext xmlns:c15="http://schemas.microsoft.com/office/drawing/2012/chart" uri="{CE6537A1-D6FC-4f65-9D91-7224C49458BB}">
                 <c15:showLeaderLines val="1"/>
                 <c15:leaderLines>
@@ -2719,7 +2573,7 @@
               </c:numCache>
             </c:numRef>
           </c:val>
-          <c:extLst>
+          <c:extLst xmlns:c16r2="http://schemas.microsoft.com/office/drawing/2015/06/chart">
             <c:ext xmlns:c16="http://schemas.microsoft.com/office/drawing/2014/chart" uri="{C3380CC4-5D6E-409C-BE32-E72D297353CC}">
               <c16:uniqueId val="{00000000-4B23-4CB0-8720-C8DB77044ED0}"/>
             </c:ext>
@@ -2736,11 +2590,11 @@
         </c:dLbls>
         <c:gapWidth val="267"/>
         <c:overlap val="-43"/>
-        <c:axId val="95171328"/>
-        <c:axId val="95174016"/>
+        <c:axId val="97802112"/>
+        <c:axId val="97803648"/>
       </c:barChart>
       <c:catAx>
-        <c:axId val="95171328"/>
+        <c:axId val="97802112"/>
         <c:scaling>
           <c:orientation val="minMax"/>
         </c:scaling>
@@ -2794,10 +2648,10 @@
                 <a:cs typeface="+mn-cs"/>
               </a:defRPr>
             </a:pPr>
-            <a:endParaRPr lang="vi-VN"/>
+            <a:endParaRPr lang="en-US"/>
           </a:p>
         </c:txPr>
-        <c:crossAx val="95174016"/>
+        <c:crossAx val="97803648"/>
         <c:crosses val="autoZero"/>
         <c:auto val="1"/>
         <c:lblAlgn val="ctr"/>
@@ -2805,7 +2659,7 @@
         <c:noMultiLvlLbl val="0"/>
       </c:catAx>
       <c:valAx>
-        <c:axId val="95174016"/>
+        <c:axId val="97803648"/>
         <c:scaling>
           <c:orientation val="minMax"/>
         </c:scaling>
@@ -2853,10 +2707,10 @@
                 <a:cs typeface="+mn-cs"/>
               </a:defRPr>
             </a:pPr>
-            <a:endParaRPr lang="vi-VN"/>
+            <a:endParaRPr lang="en-US"/>
           </a:p>
         </c:txPr>
-        <c:crossAx val="95171328"/>
+        <c:crossAx val="97802112"/>
         <c:crosses val="autoZero"/>
         <c:crossBetween val="between"/>
       </c:valAx>
@@ -2895,7 +2749,7 @@
                 <a:cs typeface="+mn-cs"/>
               </a:defRPr>
             </a:pPr>
-            <a:endParaRPr lang="vi-VN"/>
+            <a:endParaRPr lang="en-US"/>
           </a:p>
         </c:txPr>
       </c:dTable>
@@ -2943,17 +2797,17 @@
       <a:pPr>
         <a:defRPr/>
       </a:pPr>
-      <a:endParaRPr lang="vi-VN"/>
+      <a:endParaRPr lang="en-US"/>
     </a:p>
   </c:txPr>
-  <c:externalData r:id="rId3">
+  <c:externalData r:id="rId1">
     <c:autoUpdate val="0"/>
   </c:externalData>
 </c:chartSpace>
 </file>
 
 <file path=ppt/charts/chart6.xml><?xml version="1.0" encoding="utf-8"?>
-<c:chartSpace xmlns:c="http://schemas.openxmlformats.org/drawingml/2006/chart" xmlns:a="http://schemas.openxmlformats.org/drawingml/2006/main" xmlns:r="http://schemas.openxmlformats.org/officeDocument/2006/relationships" xmlns:c16r2="http://schemas.microsoft.com/office/drawing/2015/06/chart">
+<c:chartSpace xmlns:c="http://schemas.openxmlformats.org/drawingml/2006/chart" xmlns:a="http://schemas.openxmlformats.org/drawingml/2006/main" xmlns:r="http://schemas.openxmlformats.org/officeDocument/2006/relationships">
   <c:date1904 val="0"/>
   <c:lang val="en-US"/>
   <c:roundedCorners val="0"/>
@@ -2993,6 +2847,7 @@
           </a:p>
         </c:rich>
       </c:tx>
+      <c:layout/>
       <c:overlay val="0"/>
       <c:spPr>
         <a:noFill/>
@@ -3001,26 +2856,6 @@
         </a:ln>
         <a:effectLst/>
       </c:spPr>
-      <c:txPr>
-        <a:bodyPr rot="0" spcFirstLastPara="1" vertOverflow="ellipsis" vert="horz" wrap="square" anchor="ctr" anchorCtr="1"/>
-        <a:lstStyle/>
-        <a:p>
-          <a:pPr>
-            <a:defRPr sz="2200" b="1" i="0" u="none" strike="noStrike" kern="1200" baseline="0">
-              <a:solidFill>
-                <a:schemeClr val="dk1">
-                  <a:lumMod val="65000"/>
-                  <a:lumOff val="35000"/>
-                </a:schemeClr>
-              </a:solidFill>
-              <a:latin typeface="+mn-lt"/>
-              <a:ea typeface="+mn-ea"/>
-              <a:cs typeface="+mn-cs"/>
-            </a:defRPr>
-          </a:pPr>
-          <a:endParaRPr lang="vi-VN"/>
-        </a:p>
-      </c:txPr>
     </c:title>
     <c:autoTitleDeleted val="0"/>
     <c:plotArea>
@@ -3048,7 +2883,7 @@
                 </a:outerShdw>
               </a:effectLst>
             </c:spPr>
-            <c:extLst>
+            <c:extLst xmlns:c16r2="http://schemas.microsoft.com/office/drawing/2015/06/chart">
               <c:ext xmlns:c16="http://schemas.microsoft.com/office/drawing/2014/chart" uri="{C3380CC4-5D6E-409C-BE32-E72D297353CC}">
                 <c16:uniqueId val="{00000001-0113-4C1C-B8C2-11C7A51BD1AD}"/>
               </c:ext>
@@ -3072,7 +2907,7 @@
                 </a:outerShdw>
               </a:effectLst>
             </c:spPr>
-            <c:extLst>
+            <c:extLst xmlns:c16r2="http://schemas.microsoft.com/office/drawing/2015/06/chart">
               <c:ext xmlns:c16="http://schemas.microsoft.com/office/drawing/2014/chart" uri="{C3380CC4-5D6E-409C-BE32-E72D297353CC}">
                 <c16:uniqueId val="{00000003-0113-4C1C-B8C2-11C7A51BD1AD}"/>
               </c:ext>
@@ -3102,7 +2937,7 @@
                     <a:cs typeface="+mn-cs"/>
                   </a:defRPr>
                 </a:pPr>
-                <a:endParaRPr lang="vi-VN"/>
+                <a:endParaRPr lang="en-US"/>
               </a:p>
             </c:txPr>
             <c:dLblPos val="inEnd"/>
@@ -3127,7 +2962,7 @@
                 <a:effectLst/>
               </c:spPr>
             </c:leaderLines>
-            <c:extLst>
+            <c:extLst xmlns:c16r2="http://schemas.microsoft.com/office/drawing/2015/06/chart">
               <c:ext xmlns:c15="http://schemas.microsoft.com/office/drawing/2012/chart" uri="{CE6537A1-D6FC-4f65-9D91-7224C49458BB}"/>
             </c:extLst>
           </c:dLbls>
@@ -3160,7 +2995,7 @@
               </c:numCache>
             </c:numRef>
           </c:val>
-          <c:extLst>
+          <c:extLst xmlns:c16r2="http://schemas.microsoft.com/office/drawing/2015/06/chart">
             <c:ext xmlns:c16="http://schemas.microsoft.com/office/drawing/2014/chart" uri="{C3380CC4-5D6E-409C-BE32-E72D297353CC}">
               <c16:uniqueId val="{00000004-0113-4C1C-B8C2-11C7A51BD1AD}"/>
             </c:ext>
@@ -3188,6 +3023,7 @@
     </c:plotArea>
     <c:legend>
       <c:legendPos val="b"/>
+      <c:layout/>
       <c:overlay val="0"/>
       <c:spPr>
         <a:solidFill>
@@ -3217,7 +3053,7 @@
               <a:cs typeface="+mn-cs"/>
             </a:defRPr>
           </a:pPr>
-          <a:endParaRPr lang="vi-VN"/>
+          <a:endParaRPr lang="en-US"/>
         </a:p>
       </c:txPr>
     </c:legend>
@@ -3254,10 +3090,10 @@
       <a:pPr>
         <a:defRPr/>
       </a:pPr>
-      <a:endParaRPr lang="vi-VN"/>
+      <a:endParaRPr lang="en-US"/>
     </a:p>
   </c:txPr>
-  <c:externalData r:id="rId3">
+  <c:externalData r:id="rId1">
     <c:autoUpdate val="0"/>
   </c:externalData>
 </c:chartSpace>
@@ -6788,7 +6624,7 @@
         <cdr:cNvPr id="3" name="Straight Connector 2">
           <a:extLst xmlns:a="http://schemas.openxmlformats.org/drawingml/2006/main">
             <a:ext uri="{FF2B5EF4-FFF2-40B4-BE49-F238E27FC236}">
-              <a16:creationId xmlns:a16="http://schemas.microsoft.com/office/drawing/2014/main" id="{BF777741-D4B8-4089-B8C8-2289CB6D3179}"/>
+              <a16:creationId xmlns:a16="http://schemas.microsoft.com/office/drawing/2014/main" xmlns="" id="{BF777741-D4B8-4089-B8C8-2289CB6D3179}"/>
             </a:ext>
           </a:extLst>
         </cdr:cNvPr>
@@ -6842,7 +6678,7 @@
         <cdr:cNvPr id="4" name="Straight Connector 3">
           <a:extLst xmlns:a="http://schemas.openxmlformats.org/drawingml/2006/main">
             <a:ext uri="{FF2B5EF4-FFF2-40B4-BE49-F238E27FC236}">
-              <a16:creationId xmlns:a16="http://schemas.microsoft.com/office/drawing/2014/main" id="{53ECC892-A3EB-4D93-BB44-B542AB69CC93}"/>
+              <a16:creationId xmlns:a16="http://schemas.microsoft.com/office/drawing/2014/main" xmlns="" id="{53ECC892-A3EB-4D93-BB44-B542AB69CC93}"/>
             </a:ext>
           </a:extLst>
         </cdr:cNvPr>
@@ -6896,7 +6732,7 @@
         <cdr:cNvPr id="6" name="Straight Connector 5">
           <a:extLst xmlns:a="http://schemas.openxmlformats.org/drawingml/2006/main">
             <a:ext uri="{FF2B5EF4-FFF2-40B4-BE49-F238E27FC236}">
-              <a16:creationId xmlns:a16="http://schemas.microsoft.com/office/drawing/2014/main" id="{9920EF9B-07B6-4DB2-93BE-E8D549579B72}"/>
+              <a16:creationId xmlns:a16="http://schemas.microsoft.com/office/drawing/2014/main" xmlns="" id="{9920EF9B-07B6-4DB2-93BE-E8D549579B72}"/>
             </a:ext>
           </a:extLst>
         </cdr:cNvPr>
@@ -6947,7 +6783,7 @@
         <cdr:cNvPr id="7" name="Straight Connector 6">
           <a:extLst xmlns:a="http://schemas.openxmlformats.org/drawingml/2006/main">
             <a:ext uri="{FF2B5EF4-FFF2-40B4-BE49-F238E27FC236}">
-              <a16:creationId xmlns:a16="http://schemas.microsoft.com/office/drawing/2014/main" id="{583D32F8-E5FE-4BC7-A96B-2737F1A19336}"/>
+              <a16:creationId xmlns:a16="http://schemas.microsoft.com/office/drawing/2014/main" xmlns="" id="{583D32F8-E5FE-4BC7-A96B-2737F1A19336}"/>
             </a:ext>
           </a:extLst>
         </cdr:cNvPr>
@@ -6998,7 +6834,7 @@
         <cdr:cNvPr id="12" name="Down Arrow 9">
           <a:extLst xmlns:a="http://schemas.openxmlformats.org/drawingml/2006/main">
             <a:ext uri="{FF2B5EF4-FFF2-40B4-BE49-F238E27FC236}">
-              <a16:creationId xmlns:a16="http://schemas.microsoft.com/office/drawing/2014/main" id="{00000000-0008-0000-0000-00000A000000}"/>
+              <a16:creationId xmlns:a16="http://schemas.microsoft.com/office/drawing/2014/main" xmlns="" id="{00000000-0008-0000-0000-00000A000000}"/>
             </a:ext>
           </a:extLst>
         </cdr:cNvPr>
@@ -7144,7 +6980,7 @@
         <cdr:cNvPr id="13" name="TextBox 10">
           <a:extLst xmlns:a="http://schemas.openxmlformats.org/drawingml/2006/main">
             <a:ext uri="{FF2B5EF4-FFF2-40B4-BE49-F238E27FC236}">
-              <a16:creationId xmlns:a16="http://schemas.microsoft.com/office/drawing/2014/main" id="{00000000-0008-0000-0000-00000B000000}"/>
+              <a16:creationId xmlns:a16="http://schemas.microsoft.com/office/drawing/2014/main" xmlns="" id="{00000000-0008-0000-0000-00000B000000}"/>
             </a:ext>
           </a:extLst>
         </cdr:cNvPr>
@@ -7310,7 +7146,7 @@
         <cdr:cNvPr id="15" name="TextBox 12">
           <a:extLst xmlns:a="http://schemas.openxmlformats.org/drawingml/2006/main">
             <a:ext uri="{FF2B5EF4-FFF2-40B4-BE49-F238E27FC236}">
-              <a16:creationId xmlns:a16="http://schemas.microsoft.com/office/drawing/2014/main" id="{00000000-0008-0000-0000-00000D000000}"/>
+              <a16:creationId xmlns:a16="http://schemas.microsoft.com/office/drawing/2014/main" xmlns="" id="{00000000-0008-0000-0000-00000D000000}"/>
             </a:ext>
           </a:extLst>
         </cdr:cNvPr>
@@ -7467,7 +7303,7 @@
         <cdr:cNvPr id="16" name="Right Arrow 1">
           <a:extLst xmlns:a="http://schemas.openxmlformats.org/drawingml/2006/main">
             <a:ext uri="{FF2B5EF4-FFF2-40B4-BE49-F238E27FC236}">
-              <a16:creationId xmlns:a16="http://schemas.microsoft.com/office/drawing/2014/main" id="{2E3A6C5A-136D-4C70-9C94-48C8057ED4DA}"/>
+              <a16:creationId xmlns:a16="http://schemas.microsoft.com/office/drawing/2014/main" xmlns="" id="{2E3A6C5A-136D-4C70-9C94-48C8057ED4DA}"/>
             </a:ext>
           </a:extLst>
         </cdr:cNvPr>
@@ -7612,7 +7448,7 @@
         <cdr:cNvPr id="17" name="Straight Connector 16">
           <a:extLst xmlns:a="http://schemas.openxmlformats.org/drawingml/2006/main">
             <a:ext uri="{FF2B5EF4-FFF2-40B4-BE49-F238E27FC236}">
-              <a16:creationId xmlns:a16="http://schemas.microsoft.com/office/drawing/2014/main" id="{1451979F-E9D1-4827-A40A-4EC43DC43DF6}"/>
+              <a16:creationId xmlns:a16="http://schemas.microsoft.com/office/drawing/2014/main" xmlns="" id="{1451979F-E9D1-4827-A40A-4EC43DC43DF6}"/>
             </a:ext>
           </a:extLst>
         </cdr:cNvPr>
@@ -7667,7 +7503,7 @@
         <cdr:cNvPr id="3" name="Straight Connector 2">
           <a:extLst xmlns:a="http://schemas.openxmlformats.org/drawingml/2006/main">
             <a:ext uri="{FF2B5EF4-FFF2-40B4-BE49-F238E27FC236}">
-              <a16:creationId xmlns:a16="http://schemas.microsoft.com/office/drawing/2014/main" id="{4E62BC5C-C9E1-4E17-9E59-A54923A89A48}"/>
+              <a16:creationId xmlns:a16="http://schemas.microsoft.com/office/drawing/2014/main" xmlns="" id="{4E62BC5C-C9E1-4E17-9E59-A54923A89A48}"/>
             </a:ext>
           </a:extLst>
         </cdr:cNvPr>
@@ -7712,7 +7548,7 @@
         <cdr:cNvPr id="5" name="Straight Connector 4">
           <a:extLst xmlns:a="http://schemas.openxmlformats.org/drawingml/2006/main">
             <a:ext uri="{FF2B5EF4-FFF2-40B4-BE49-F238E27FC236}">
-              <a16:creationId xmlns:a16="http://schemas.microsoft.com/office/drawing/2014/main" id="{35D48543-41DD-473C-A0FD-B5D9C8769501}"/>
+              <a16:creationId xmlns:a16="http://schemas.microsoft.com/office/drawing/2014/main" xmlns="" id="{35D48543-41DD-473C-A0FD-B5D9C8769501}"/>
             </a:ext>
           </a:extLst>
         </cdr:cNvPr>
@@ -7757,7 +7593,7 @@
         <cdr:cNvPr id="4" name="TextBox 15">
           <a:extLst xmlns:a="http://schemas.openxmlformats.org/drawingml/2006/main">
             <a:ext uri="{FF2B5EF4-FFF2-40B4-BE49-F238E27FC236}">
-              <a16:creationId xmlns:a16="http://schemas.microsoft.com/office/drawing/2014/main" id="{00000000-0008-0000-0200-000010000000}"/>
+              <a16:creationId xmlns:a16="http://schemas.microsoft.com/office/drawing/2014/main" xmlns="" id="{00000000-0008-0000-0200-000010000000}"/>
             </a:ext>
           </a:extLst>
         </cdr:cNvPr>
@@ -7912,7 +7748,7 @@
         <cdr:cNvPr id="6" name="TextBox 13">
           <a:extLst xmlns:a="http://schemas.openxmlformats.org/drawingml/2006/main">
             <a:ext uri="{FF2B5EF4-FFF2-40B4-BE49-F238E27FC236}">
-              <a16:creationId xmlns:a16="http://schemas.microsoft.com/office/drawing/2014/main" id="{00000000-0008-0000-0200-00000E000000}"/>
+              <a16:creationId xmlns:a16="http://schemas.microsoft.com/office/drawing/2014/main" xmlns="" id="{00000000-0008-0000-0200-00000E000000}"/>
             </a:ext>
           </a:extLst>
         </cdr:cNvPr>
@@ -8067,7 +7903,7 @@
         <cdr:cNvPr id="7" name="TextBox 14">
           <a:extLst xmlns:a="http://schemas.openxmlformats.org/drawingml/2006/main">
             <a:ext uri="{FF2B5EF4-FFF2-40B4-BE49-F238E27FC236}">
-              <a16:creationId xmlns:a16="http://schemas.microsoft.com/office/drawing/2014/main" id="{00000000-0008-0000-0200-00000F000000}"/>
+              <a16:creationId xmlns:a16="http://schemas.microsoft.com/office/drawing/2014/main" xmlns="" id="{00000000-0008-0000-0200-00000F000000}"/>
             </a:ext>
           </a:extLst>
         </cdr:cNvPr>
@@ -8222,7 +8058,7 @@
         <cdr:cNvPr id="8" name="TextBox 16">
           <a:extLst xmlns:a="http://schemas.openxmlformats.org/drawingml/2006/main">
             <a:ext uri="{FF2B5EF4-FFF2-40B4-BE49-F238E27FC236}">
-              <a16:creationId xmlns:a16="http://schemas.microsoft.com/office/drawing/2014/main" id="{00000000-0008-0000-0200-000011000000}"/>
+              <a16:creationId xmlns:a16="http://schemas.microsoft.com/office/drawing/2014/main" xmlns="" id="{00000000-0008-0000-0200-000011000000}"/>
             </a:ext>
           </a:extLst>
         </cdr:cNvPr>
@@ -11782,28 +11618,28 @@
                 <a:gridCol w="1563275">
                   <a:extLst>
                     <a:ext uri="{9D8B030D-6E8A-4147-A177-3AD203B41FA5}">
-                      <a16:colId xmlns:a16="http://schemas.microsoft.com/office/drawing/2014/main" val="3764493280"/>
+                      <a16:colId xmlns:a16="http://schemas.microsoft.com/office/drawing/2014/main" xmlns="" val="3764493280"/>
                     </a:ext>
                   </a:extLst>
                 </a:gridCol>
                 <a:gridCol w="2205535">
                   <a:extLst>
                     <a:ext uri="{9D8B030D-6E8A-4147-A177-3AD203B41FA5}">
-                      <a16:colId xmlns:a16="http://schemas.microsoft.com/office/drawing/2014/main" val="1107145944"/>
+                      <a16:colId xmlns:a16="http://schemas.microsoft.com/office/drawing/2014/main" xmlns="" val="1107145944"/>
                     </a:ext>
                   </a:extLst>
                 </a:gridCol>
                 <a:gridCol w="5350476">
                   <a:extLst>
                     <a:ext uri="{9D8B030D-6E8A-4147-A177-3AD203B41FA5}">
-                      <a16:colId xmlns:a16="http://schemas.microsoft.com/office/drawing/2014/main" val="150228395"/>
+                      <a16:colId xmlns:a16="http://schemas.microsoft.com/office/drawing/2014/main" xmlns="" val="150228395"/>
                     </a:ext>
                   </a:extLst>
                 </a:gridCol>
                 <a:gridCol w="1703173">
                   <a:extLst>
                     <a:ext uri="{9D8B030D-6E8A-4147-A177-3AD203B41FA5}">
-                      <a16:colId xmlns:a16="http://schemas.microsoft.com/office/drawing/2014/main" val="2377693920"/>
+                      <a16:colId xmlns:a16="http://schemas.microsoft.com/office/drawing/2014/main" xmlns="" val="2377693920"/>
                     </a:ext>
                   </a:extLst>
                 </a:gridCol>
@@ -11985,7 +11821,7 @@
                 </a:tc>
                 <a:extLst>
                   <a:ext uri="{0D108BD9-81ED-4DB2-BD59-A6C34878D82A}">
-                    <a16:rowId xmlns:a16="http://schemas.microsoft.com/office/drawing/2014/main" val="2008715012"/>
+                    <a16:rowId xmlns:a16="http://schemas.microsoft.com/office/drawing/2014/main" xmlns="" val="2008715012"/>
                   </a:ext>
                 </a:extLst>
               </a:tr>
@@ -12249,7 +12085,7 @@
                 </a:tc>
                 <a:extLst>
                   <a:ext uri="{0D108BD9-81ED-4DB2-BD59-A6C34878D82A}">
-                    <a16:rowId xmlns:a16="http://schemas.microsoft.com/office/drawing/2014/main" val="317031761"/>
+                    <a16:rowId xmlns:a16="http://schemas.microsoft.com/office/drawing/2014/main" xmlns="" val="317031761"/>
                   </a:ext>
                 </a:extLst>
               </a:tr>
@@ -12450,7 +12286,7 @@
                 </a:tc>
                 <a:extLst>
                   <a:ext uri="{0D108BD9-81ED-4DB2-BD59-A6C34878D82A}">
-                    <a16:rowId xmlns:a16="http://schemas.microsoft.com/office/drawing/2014/main" val="4209929873"/>
+                    <a16:rowId xmlns:a16="http://schemas.microsoft.com/office/drawing/2014/main" xmlns="" val="4209929873"/>
                   </a:ext>
                 </a:extLst>
               </a:tr>
@@ -12714,7 +12550,7 @@
                 </a:tc>
                 <a:extLst>
                   <a:ext uri="{0D108BD9-81ED-4DB2-BD59-A6C34878D82A}">
-                    <a16:rowId xmlns:a16="http://schemas.microsoft.com/office/drawing/2014/main" val="4062115742"/>
+                    <a16:rowId xmlns:a16="http://schemas.microsoft.com/office/drawing/2014/main" xmlns="" val="4062115742"/>
                   </a:ext>
                 </a:extLst>
               </a:tr>
@@ -12978,7 +12814,7 @@
                 </a:tc>
                 <a:extLst>
                   <a:ext uri="{0D108BD9-81ED-4DB2-BD59-A6C34878D82A}">
-                    <a16:rowId xmlns:a16="http://schemas.microsoft.com/office/drawing/2014/main" val="3709749796"/>
+                    <a16:rowId xmlns:a16="http://schemas.microsoft.com/office/drawing/2014/main" xmlns="" val="3709749796"/>
                   </a:ext>
                 </a:extLst>
               </a:tr>
@@ -13242,7 +13078,7 @@
                 </a:tc>
                 <a:extLst>
                   <a:ext uri="{0D108BD9-81ED-4DB2-BD59-A6C34878D82A}">
-                    <a16:rowId xmlns:a16="http://schemas.microsoft.com/office/drawing/2014/main" val="2156158299"/>
+                    <a16:rowId xmlns:a16="http://schemas.microsoft.com/office/drawing/2014/main" xmlns="" val="2156158299"/>
                   </a:ext>
                 </a:extLst>
               </a:tr>
@@ -13506,7 +13342,7 @@
                 </a:tc>
                 <a:extLst>
                   <a:ext uri="{0D108BD9-81ED-4DB2-BD59-A6C34878D82A}">
-                    <a16:rowId xmlns:a16="http://schemas.microsoft.com/office/drawing/2014/main" val="2287662656"/>
+                    <a16:rowId xmlns:a16="http://schemas.microsoft.com/office/drawing/2014/main" xmlns="" val="2287662656"/>
                   </a:ext>
                 </a:extLst>
               </a:tr>
@@ -13770,7 +13606,7 @@
                 </a:tc>
                 <a:extLst>
                   <a:ext uri="{0D108BD9-81ED-4DB2-BD59-A6C34878D82A}">
-                    <a16:rowId xmlns:a16="http://schemas.microsoft.com/office/drawing/2014/main" val="3813207462"/>
+                    <a16:rowId xmlns:a16="http://schemas.microsoft.com/office/drawing/2014/main" xmlns="" val="3813207462"/>
                   </a:ext>
                 </a:extLst>
               </a:tr>
@@ -14034,7 +13870,7 @@
                 </a:tc>
                 <a:extLst>
                   <a:ext uri="{0D108BD9-81ED-4DB2-BD59-A6C34878D82A}">
-                    <a16:rowId xmlns:a16="http://schemas.microsoft.com/office/drawing/2014/main" val="2573932323"/>
+                    <a16:rowId xmlns:a16="http://schemas.microsoft.com/office/drawing/2014/main" xmlns="" val="2573932323"/>
                   </a:ext>
                 </a:extLst>
               </a:tr>
@@ -14861,124 +14697,6 @@
           <a:chExt cx="0" cy="0"/>
         </a:xfrm>
       </p:grpSpPr>
-      <p:sp>
-        <p:nvSpPr>
-          <p:cNvPr id="2" name="Title 1"/>
-          <p:cNvSpPr>
-            <a:spLocks noGrp="1"/>
-          </p:cNvSpPr>
-          <p:nvPr>
-            <p:ph type="title"/>
-          </p:nvPr>
-        </p:nvSpPr>
-        <p:spPr/>
-        <p:txBody>
-          <a:bodyPr/>
-          <a:lstStyle/>
-          <a:p>
-            <a:r>
-              <a:rPr lang="en-US" dirty="0">
-                <a:latin typeface="Tahoma" panose="020B0604030504040204" pitchFamily="34" charset="0"/>
-                <a:ea typeface="Tahoma" panose="020B0604030504040204" pitchFamily="34" charset="0"/>
-                <a:cs typeface="Tahoma" panose="020B0604030504040204" pitchFamily="34" charset="0"/>
-              </a:rPr>
-              <a:t>Schedule</a:t>
-            </a:r>
-            <a:endParaRPr lang="vi-VN" dirty="0">
-              <a:latin typeface="Tahoma" panose="020B0604030504040204" pitchFamily="34" charset="0"/>
-              <a:ea typeface="Tahoma" panose="020B0604030504040204" pitchFamily="34" charset="0"/>
-              <a:cs typeface="Tahoma" panose="020B0604030504040204" pitchFamily="34" charset="0"/>
-            </a:endParaRPr>
-          </a:p>
-        </p:txBody>
-      </p:sp>
-      <p:sp>
-        <p:nvSpPr>
-          <p:cNvPr id="3" name="Content Placeholder 2"/>
-          <p:cNvSpPr>
-            <a:spLocks noGrp="1"/>
-          </p:cNvSpPr>
-          <p:nvPr>
-            <p:ph idx="1"/>
-          </p:nvPr>
-        </p:nvSpPr>
-        <p:spPr/>
-        <p:txBody>
-          <a:bodyPr/>
-          <a:lstStyle/>
-          <a:p>
-            <a:endParaRPr lang="vi-VN">
-              <a:latin typeface="Tahoma" panose="020B0604030504040204" pitchFamily="34" charset="0"/>
-              <a:ea typeface="Tahoma" panose="020B0604030504040204" pitchFamily="34" charset="0"/>
-              <a:cs typeface="Tahoma" panose="020B0604030504040204" pitchFamily="34" charset="0"/>
-            </a:endParaRPr>
-          </a:p>
-        </p:txBody>
-      </p:sp>
-      <p:sp>
-        <p:nvSpPr>
-          <p:cNvPr id="4" name="Slide Number Placeholder 3"/>
-          <p:cNvSpPr>
-            <a:spLocks noGrp="1"/>
-          </p:cNvSpPr>
-          <p:nvPr>
-            <p:ph type="sldNum" sz="quarter" idx="12"/>
-          </p:nvPr>
-        </p:nvSpPr>
-        <p:spPr/>
-        <p:txBody>
-          <a:bodyPr/>
-          <a:lstStyle/>
-          <a:p>
-            <a:fld id="{703E83EE-B7BB-4A1D-A775-A1100B928FF1}" type="slidenum">
-              <a:rPr lang="vi-VN" smtClean="0">
-                <a:latin typeface="Tahoma" panose="020B0604030504040204" pitchFamily="34" charset="0"/>
-                <a:ea typeface="Tahoma" panose="020B0604030504040204" pitchFamily="34" charset="0"/>
-                <a:cs typeface="Tahoma" panose="020B0604030504040204" pitchFamily="34" charset="0"/>
-              </a:rPr>
-              <a:t>17</a:t>
-            </a:fld>
-            <a:endParaRPr lang="vi-VN">
-              <a:latin typeface="Tahoma" panose="020B0604030504040204" pitchFamily="34" charset="0"/>
-              <a:ea typeface="Tahoma" panose="020B0604030504040204" pitchFamily="34" charset="0"/>
-              <a:cs typeface="Tahoma" panose="020B0604030504040204" pitchFamily="34" charset="0"/>
-            </a:endParaRPr>
-          </a:p>
-        </p:txBody>
-      </p:sp>
-    </p:spTree>
-    <p:extLst>
-      <p:ext uri="{BB962C8B-B14F-4D97-AF65-F5344CB8AC3E}">
-        <p14:creationId xmlns:p14="http://schemas.microsoft.com/office/powerpoint/2010/main" val="1914767132"/>
-      </p:ext>
-    </p:extLst>
-  </p:cSld>
-  <p:clrMapOvr>
-    <a:masterClrMapping/>
-  </p:clrMapOvr>
-  <p:transition spd="slow">
-    <p:cover/>
-  </p:transition>
-</p:sld>
-</file>
-
-<file path=ppt/slides/slide18.xml><?xml version="1.0" encoding="utf-8"?>
-<p:sld xmlns:a="http://schemas.openxmlformats.org/drawingml/2006/main" xmlns:r="http://schemas.openxmlformats.org/officeDocument/2006/relationships" xmlns:p="http://schemas.openxmlformats.org/presentationml/2006/main">
-  <p:cSld>
-    <p:spTree>
-      <p:nvGrpSpPr>
-        <p:cNvPr id="1" name=""/>
-        <p:cNvGrpSpPr/>
-        <p:nvPr/>
-      </p:nvGrpSpPr>
-      <p:grpSpPr>
-        <a:xfrm>
-          <a:off x="0" y="0"/>
-          <a:ext cx="0" cy="0"/>
-          <a:chOff x="0" y="0"/>
-          <a:chExt cx="0" cy="0"/>
-        </a:xfrm>
-      </p:grpSpPr>
       <p:graphicFrame>
         <p:nvGraphicFramePr>
           <p:cNvPr id="4" name="Chart 3">
@@ -15022,7 +14740,7 @@
           <a:p>
             <a:fld id="{703E83EE-B7BB-4A1D-A775-A1100B928FF1}" type="slidenum">
               <a:rPr lang="vi-VN" smtClean="0"/>
-              <a:t>18</a:t>
+              <a:t>17</a:t>
             </a:fld>
             <a:endParaRPr lang="vi-VN"/>
           </a:p>
@@ -15044,7 +14762,7 @@
 </p:sld>
 </file>
 
-<file path=ppt/slides/slide19.xml><?xml version="1.0" encoding="utf-8"?>
+<file path=ppt/slides/slide18.xml><?xml version="1.0" encoding="utf-8"?>
 <p:sld xmlns:a="http://schemas.openxmlformats.org/drawingml/2006/main" xmlns:r="http://schemas.openxmlformats.org/officeDocument/2006/relationships" xmlns:p="http://schemas.openxmlformats.org/presentationml/2006/main">
   <p:cSld>
     <p:spTree>
@@ -15066,7 +14784,7 @@
           <p:cNvPr id="6" name="Chart 5">
             <a:extLst>
               <a:ext uri="{FF2B5EF4-FFF2-40B4-BE49-F238E27FC236}">
-                <a16:creationId xmlns:a16="http://schemas.microsoft.com/office/drawing/2014/main" id="{00000000-0008-0000-0200-000002000000}"/>
+                <a16:creationId xmlns:a16="http://schemas.microsoft.com/office/drawing/2014/main" xmlns="" id="{00000000-0008-0000-0200-000002000000}"/>
               </a:ext>
             </a:extLst>
           </p:cNvPr>
@@ -15108,7 +14826,7 @@
           <a:p>
             <a:fld id="{703E83EE-B7BB-4A1D-A775-A1100B928FF1}" type="slidenum">
               <a:rPr lang="vi-VN" smtClean="0"/>
-              <a:t>19</a:t>
+              <a:t>18</a:t>
             </a:fld>
             <a:endParaRPr lang="vi-VN"/>
           </a:p>
@@ -15118,6 +14836,124 @@
     <p:extLst>
       <p:ext uri="{BB962C8B-B14F-4D97-AF65-F5344CB8AC3E}">
         <p14:creationId xmlns:p14="http://schemas.microsoft.com/office/powerpoint/2010/main" val="4102137098"/>
+      </p:ext>
+    </p:extLst>
+  </p:cSld>
+  <p:clrMapOvr>
+    <a:masterClrMapping/>
+  </p:clrMapOvr>
+  <p:transition spd="slow">
+    <p:cover/>
+  </p:transition>
+</p:sld>
+</file>
+
+<file path=ppt/slides/slide19.xml><?xml version="1.0" encoding="utf-8"?>
+<p:sld xmlns:a="http://schemas.openxmlformats.org/drawingml/2006/main" xmlns:r="http://schemas.openxmlformats.org/officeDocument/2006/relationships" xmlns:p="http://schemas.openxmlformats.org/presentationml/2006/main">
+  <p:cSld>
+    <p:spTree>
+      <p:nvGrpSpPr>
+        <p:cNvPr id="1" name=""/>
+        <p:cNvGrpSpPr/>
+        <p:nvPr/>
+      </p:nvGrpSpPr>
+      <p:grpSpPr>
+        <a:xfrm>
+          <a:off x="0" y="0"/>
+          <a:ext cx="0" cy="0"/>
+          <a:chOff x="0" y="0"/>
+          <a:chExt cx="0" cy="0"/>
+        </a:xfrm>
+      </p:grpSpPr>
+      <p:sp>
+        <p:nvSpPr>
+          <p:cNvPr id="2" name="Title 1"/>
+          <p:cNvSpPr>
+            <a:spLocks noGrp="1"/>
+          </p:cNvSpPr>
+          <p:nvPr>
+            <p:ph type="title"/>
+          </p:nvPr>
+        </p:nvSpPr>
+        <p:spPr/>
+        <p:txBody>
+          <a:bodyPr/>
+          <a:lstStyle/>
+          <a:p>
+            <a:r>
+              <a:rPr lang="en-US" dirty="0">
+                <a:latin typeface="Tahoma" panose="020B0604030504040204" pitchFamily="34" charset="0"/>
+                <a:ea typeface="Tahoma" panose="020B0604030504040204" pitchFamily="34" charset="0"/>
+                <a:cs typeface="Tahoma" panose="020B0604030504040204" pitchFamily="34" charset="0"/>
+              </a:rPr>
+              <a:t>Risk and issue report</a:t>
+            </a:r>
+            <a:endParaRPr lang="vi-VN" dirty="0">
+              <a:latin typeface="Tahoma" panose="020B0604030504040204" pitchFamily="34" charset="0"/>
+              <a:ea typeface="Tahoma" panose="020B0604030504040204" pitchFamily="34" charset="0"/>
+              <a:cs typeface="Tahoma" panose="020B0604030504040204" pitchFamily="34" charset="0"/>
+            </a:endParaRPr>
+          </a:p>
+        </p:txBody>
+      </p:sp>
+      <p:sp>
+        <p:nvSpPr>
+          <p:cNvPr id="3" name="Text Placeholder 2"/>
+          <p:cNvSpPr>
+            <a:spLocks noGrp="1"/>
+          </p:cNvSpPr>
+          <p:nvPr>
+            <p:ph type="body" idx="1"/>
+          </p:nvPr>
+        </p:nvSpPr>
+        <p:spPr/>
+        <p:txBody>
+          <a:bodyPr/>
+          <a:lstStyle/>
+          <a:p>
+            <a:endParaRPr lang="vi-VN">
+              <a:latin typeface="Tahoma" panose="020B0604030504040204" pitchFamily="34" charset="0"/>
+              <a:ea typeface="Tahoma" panose="020B0604030504040204" pitchFamily="34" charset="0"/>
+              <a:cs typeface="Tahoma" panose="020B0604030504040204" pitchFamily="34" charset="0"/>
+            </a:endParaRPr>
+          </a:p>
+        </p:txBody>
+      </p:sp>
+      <p:sp>
+        <p:nvSpPr>
+          <p:cNvPr id="6" name="Slide Number Placeholder 5"/>
+          <p:cNvSpPr>
+            <a:spLocks noGrp="1"/>
+          </p:cNvSpPr>
+          <p:nvPr>
+            <p:ph type="sldNum" sz="quarter" idx="12"/>
+          </p:nvPr>
+        </p:nvSpPr>
+        <p:spPr/>
+        <p:txBody>
+          <a:bodyPr/>
+          <a:lstStyle/>
+          <a:p>
+            <a:fld id="{703E83EE-B7BB-4A1D-A775-A1100B928FF1}" type="slidenum">
+              <a:rPr lang="vi-VN" smtClean="0">
+                <a:latin typeface="Tahoma" panose="020B0604030504040204" pitchFamily="34" charset="0"/>
+                <a:ea typeface="Tahoma" panose="020B0604030504040204" pitchFamily="34" charset="0"/>
+                <a:cs typeface="Tahoma" panose="020B0604030504040204" pitchFamily="34" charset="0"/>
+              </a:rPr>
+              <a:t>19</a:t>
+            </a:fld>
+            <a:endParaRPr lang="vi-VN">
+              <a:latin typeface="Tahoma" panose="020B0604030504040204" pitchFamily="34" charset="0"/>
+              <a:ea typeface="Tahoma" panose="020B0604030504040204" pitchFamily="34" charset="0"/>
+              <a:cs typeface="Tahoma" panose="020B0604030504040204" pitchFamily="34" charset="0"/>
+            </a:endParaRPr>
+          </a:p>
+        </p:txBody>
+      </p:sp>
+    </p:spTree>
+    <p:extLst>
+      <p:ext uri="{BB962C8B-B14F-4D97-AF65-F5344CB8AC3E}">
+        <p14:creationId xmlns:p14="http://schemas.microsoft.com/office/powerpoint/2010/main" val="1512741452"/>
       </p:ext>
     </p:extLst>
   </p:cSld>
@@ -15277,124 +15113,6 @@
 </file>
 
 <file path=ppt/slides/slide20.xml><?xml version="1.0" encoding="utf-8"?>
-<p:sld xmlns:a="http://schemas.openxmlformats.org/drawingml/2006/main" xmlns:r="http://schemas.openxmlformats.org/officeDocument/2006/relationships" xmlns:p="http://schemas.openxmlformats.org/presentationml/2006/main">
-  <p:cSld>
-    <p:spTree>
-      <p:nvGrpSpPr>
-        <p:cNvPr id="1" name=""/>
-        <p:cNvGrpSpPr/>
-        <p:nvPr/>
-      </p:nvGrpSpPr>
-      <p:grpSpPr>
-        <a:xfrm>
-          <a:off x="0" y="0"/>
-          <a:ext cx="0" cy="0"/>
-          <a:chOff x="0" y="0"/>
-          <a:chExt cx="0" cy="0"/>
-        </a:xfrm>
-      </p:grpSpPr>
-      <p:sp>
-        <p:nvSpPr>
-          <p:cNvPr id="2" name="Title 1"/>
-          <p:cNvSpPr>
-            <a:spLocks noGrp="1"/>
-          </p:cNvSpPr>
-          <p:nvPr>
-            <p:ph type="title"/>
-          </p:nvPr>
-        </p:nvSpPr>
-        <p:spPr/>
-        <p:txBody>
-          <a:bodyPr/>
-          <a:lstStyle/>
-          <a:p>
-            <a:r>
-              <a:rPr lang="en-US" dirty="0">
-                <a:latin typeface="Tahoma" panose="020B0604030504040204" pitchFamily="34" charset="0"/>
-                <a:ea typeface="Tahoma" panose="020B0604030504040204" pitchFamily="34" charset="0"/>
-                <a:cs typeface="Tahoma" panose="020B0604030504040204" pitchFamily="34" charset="0"/>
-              </a:rPr>
-              <a:t>Risk and issue report</a:t>
-            </a:r>
-            <a:endParaRPr lang="vi-VN" dirty="0">
-              <a:latin typeface="Tahoma" panose="020B0604030504040204" pitchFamily="34" charset="0"/>
-              <a:ea typeface="Tahoma" panose="020B0604030504040204" pitchFamily="34" charset="0"/>
-              <a:cs typeface="Tahoma" panose="020B0604030504040204" pitchFamily="34" charset="0"/>
-            </a:endParaRPr>
-          </a:p>
-        </p:txBody>
-      </p:sp>
-      <p:sp>
-        <p:nvSpPr>
-          <p:cNvPr id="3" name="Text Placeholder 2"/>
-          <p:cNvSpPr>
-            <a:spLocks noGrp="1"/>
-          </p:cNvSpPr>
-          <p:nvPr>
-            <p:ph type="body" idx="1"/>
-          </p:nvPr>
-        </p:nvSpPr>
-        <p:spPr/>
-        <p:txBody>
-          <a:bodyPr/>
-          <a:lstStyle/>
-          <a:p>
-            <a:endParaRPr lang="vi-VN">
-              <a:latin typeface="Tahoma" panose="020B0604030504040204" pitchFamily="34" charset="0"/>
-              <a:ea typeface="Tahoma" panose="020B0604030504040204" pitchFamily="34" charset="0"/>
-              <a:cs typeface="Tahoma" panose="020B0604030504040204" pitchFamily="34" charset="0"/>
-            </a:endParaRPr>
-          </a:p>
-        </p:txBody>
-      </p:sp>
-      <p:sp>
-        <p:nvSpPr>
-          <p:cNvPr id="6" name="Slide Number Placeholder 5"/>
-          <p:cNvSpPr>
-            <a:spLocks noGrp="1"/>
-          </p:cNvSpPr>
-          <p:nvPr>
-            <p:ph type="sldNum" sz="quarter" idx="12"/>
-          </p:nvPr>
-        </p:nvSpPr>
-        <p:spPr/>
-        <p:txBody>
-          <a:bodyPr/>
-          <a:lstStyle/>
-          <a:p>
-            <a:fld id="{703E83EE-B7BB-4A1D-A775-A1100B928FF1}" type="slidenum">
-              <a:rPr lang="vi-VN" smtClean="0">
-                <a:latin typeface="Tahoma" panose="020B0604030504040204" pitchFamily="34" charset="0"/>
-                <a:ea typeface="Tahoma" panose="020B0604030504040204" pitchFamily="34" charset="0"/>
-                <a:cs typeface="Tahoma" panose="020B0604030504040204" pitchFamily="34" charset="0"/>
-              </a:rPr>
-              <a:t>20</a:t>
-            </a:fld>
-            <a:endParaRPr lang="vi-VN">
-              <a:latin typeface="Tahoma" panose="020B0604030504040204" pitchFamily="34" charset="0"/>
-              <a:ea typeface="Tahoma" panose="020B0604030504040204" pitchFamily="34" charset="0"/>
-              <a:cs typeface="Tahoma" panose="020B0604030504040204" pitchFamily="34" charset="0"/>
-            </a:endParaRPr>
-          </a:p>
-        </p:txBody>
-      </p:sp>
-    </p:spTree>
-    <p:extLst>
-      <p:ext uri="{BB962C8B-B14F-4D97-AF65-F5344CB8AC3E}">
-        <p14:creationId xmlns:p14="http://schemas.microsoft.com/office/powerpoint/2010/main" val="1512741452"/>
-      </p:ext>
-    </p:extLst>
-  </p:cSld>
-  <p:clrMapOvr>
-    <a:masterClrMapping/>
-  </p:clrMapOvr>
-  <p:transition spd="slow">
-    <p:cover/>
-  </p:transition>
-</p:sld>
-</file>
-
-<file path=ppt/slides/slide21.xml><?xml version="1.0" encoding="utf-8"?>
 <p:sld xmlns:a="http://schemas.openxmlformats.org/drawingml/2006/main" xmlns:r="http://schemas.openxmlformats.org/officeDocument/2006/relationships" xmlns:p="http://schemas.openxmlformats.org/presentationml/2006/main">
   <p:cSld>
     <p:spTree>
@@ -15538,7 +15256,7 @@
           <a:p>
             <a:fld id="{703E83EE-B7BB-4A1D-A775-A1100B928FF1}" type="slidenum">
               <a:rPr lang="vi-VN" smtClean="0"/>
-              <a:t>21</a:t>
+              <a:t>20</a:t>
             </a:fld>
             <a:endParaRPr lang="vi-VN"/>
           </a:p>
@@ -15560,7 +15278,7 @@
 </p:sld>
 </file>
 
-<file path=ppt/slides/slide22.xml><?xml version="1.0" encoding="utf-8"?>
+<file path=ppt/slides/slide21.xml><?xml version="1.0" encoding="utf-8"?>
 <p:sld xmlns:a="http://schemas.openxmlformats.org/drawingml/2006/main" xmlns:r="http://schemas.openxmlformats.org/officeDocument/2006/relationships" xmlns:p="http://schemas.openxmlformats.org/presentationml/2006/main">
   <p:cSld>
     <p:spTree>
@@ -15594,7 +15312,7 @@
           <a:p>
             <a:fld id="{703E83EE-B7BB-4A1D-A775-A1100B928FF1}" type="slidenum">
               <a:rPr lang="vi-VN" smtClean="0"/>
-              <a:t>22</a:t>
+              <a:t>21</a:t>
             </a:fld>
             <a:endParaRPr lang="vi-VN"/>
           </a:p>
@@ -15605,7 +15323,7 @@
           <p:cNvPr id="7" name="Chart 6">
             <a:extLst>
               <a:ext uri="{FF2B5EF4-FFF2-40B4-BE49-F238E27FC236}">
-                <a16:creationId xmlns:a16="http://schemas.microsoft.com/office/drawing/2014/main" id="{CE0ED5F5-A0D8-4C7F-A05B-AF65D92FB984}"/>
+                <a16:creationId xmlns:a16="http://schemas.microsoft.com/office/drawing/2014/main" xmlns="" id="{CE0ED5F5-A0D8-4C7F-A05B-AF65D92FB984}"/>
               </a:ext>
             </a:extLst>
           </p:cNvPr>
@@ -15635,7 +15353,7 @@
           <p:cNvPr id="8" name="Chart 7">
             <a:extLst>
               <a:ext uri="{FF2B5EF4-FFF2-40B4-BE49-F238E27FC236}">
-                <a16:creationId xmlns:a16="http://schemas.microsoft.com/office/drawing/2014/main" id="{DF3CB91A-BF33-47BF-86B2-5302FF3E0625}"/>
+                <a16:creationId xmlns:a16="http://schemas.microsoft.com/office/drawing/2014/main" xmlns="" id="{DF3CB91A-BF33-47BF-86B2-5302FF3E0625}"/>
               </a:ext>
             </a:extLst>
           </p:cNvPr>
@@ -15665,7 +15383,7 @@
           <p:cNvPr id="9" name="Chart 8">
             <a:extLst>
               <a:ext uri="{FF2B5EF4-FFF2-40B4-BE49-F238E27FC236}">
-                <a16:creationId xmlns:a16="http://schemas.microsoft.com/office/drawing/2014/main" id="{745C757D-EEA0-4E8F-A7DF-4917898F0AF6}"/>
+                <a16:creationId xmlns:a16="http://schemas.microsoft.com/office/drawing/2014/main" xmlns="" id="{745C757D-EEA0-4E8F-A7DF-4917898F0AF6}"/>
               </a:ext>
             </a:extLst>
           </p:cNvPr>
@@ -15695,7 +15413,7 @@
           <p:cNvPr id="10" name="Chart 9">
             <a:extLst>
               <a:ext uri="{FF2B5EF4-FFF2-40B4-BE49-F238E27FC236}">
-                <a16:creationId xmlns:a16="http://schemas.microsoft.com/office/drawing/2014/main" id="{D8EAB6BE-AD1C-4008-B2AD-2A535C15335C}"/>
+                <a16:creationId xmlns:a16="http://schemas.microsoft.com/office/drawing/2014/main" xmlns="" id="{D8EAB6BE-AD1C-4008-B2AD-2A535C15335C}"/>
               </a:ext>
             </a:extLst>
           </p:cNvPr>
@@ -15736,7 +15454,7 @@
 </p:sld>
 </file>
 
-<file path=ppt/slides/slide23.xml><?xml version="1.0" encoding="utf-8"?>
+<file path=ppt/slides/slide22.xml><?xml version="1.0" encoding="utf-8"?>
 <p:sld xmlns:a="http://schemas.openxmlformats.org/drawingml/2006/main" xmlns:r="http://schemas.openxmlformats.org/officeDocument/2006/relationships" xmlns:p="http://schemas.openxmlformats.org/presentationml/2006/main">
   <p:cSld>
     <p:spTree>
@@ -15828,7 +15546,7 @@
                 <a:ea typeface="Tahoma" panose="020B0604030504040204" pitchFamily="34" charset="0"/>
                 <a:cs typeface="Tahoma" panose="020B0604030504040204" pitchFamily="34" charset="0"/>
               </a:rPr>
-              <a:t>23</a:t>
+              <a:t>22</a:t>
             </a:fld>
             <a:endParaRPr lang="vi-VN">
               <a:latin typeface="Tahoma" panose="020B0604030504040204" pitchFamily="34" charset="0"/>
@@ -15851,10 +15569,17 @@
   <p:transition spd="slow">
     <p:cover/>
   </p:transition>
+  <p:timing>
+    <p:tnLst>
+      <p:par>
+        <p:cTn id="1" dur="indefinite" restart="never" nodeType="tmRoot"/>
+      </p:par>
+    </p:tnLst>
+  </p:timing>
 </p:sld>
 </file>
 
-<file path=ppt/slides/slide24.xml><?xml version="1.0" encoding="utf-8"?>
+<file path=ppt/slides/slide23.xml><?xml version="1.0" encoding="utf-8"?>
 <p:sld xmlns:a="http://schemas.openxmlformats.org/drawingml/2006/main" xmlns:r="http://schemas.openxmlformats.org/officeDocument/2006/relationships" xmlns:p="http://schemas.openxmlformats.org/presentationml/2006/main">
   <p:cSld>
     <p:spTree>
@@ -15890,25 +15615,1862 @@
           </a:p>
         </p:txBody>
       </p:sp>
-      <p:sp>
-        <p:nvSpPr>
-          <p:cNvPr id="6" name="Content Placeholder 5"/>
-          <p:cNvSpPr>
-            <a:spLocks noGrp="1"/>
-          </p:cNvSpPr>
+      <p:graphicFrame>
+        <p:nvGraphicFramePr>
+          <p:cNvPr id="2" name="Content Placeholder 1"/>
+          <p:cNvGraphicFramePr>
+            <a:graphicFrameLocks noGrp="1"/>
+          </p:cNvGraphicFramePr>
           <p:nvPr>
             <p:ph idx="1"/>
+            <p:extLst>
+              <p:ext uri="{D42A27DB-BD31-4B8C-83A1-F6EECF244321}">
+                <p14:modId xmlns:p14="http://schemas.microsoft.com/office/powerpoint/2010/main" val="3637520714"/>
+              </p:ext>
+            </p:extLst>
           </p:nvPr>
-        </p:nvSpPr>
-        <p:spPr/>
-        <p:txBody>
-          <a:bodyPr/>
-          <a:lstStyle/>
-          <a:p>
-            <a:endParaRPr lang="vi-VN"/>
-          </a:p>
-        </p:txBody>
-      </p:sp>
+        </p:nvGraphicFramePr>
+        <p:xfrm>
+          <a:off x="0" y="17482"/>
+          <a:ext cx="12282153" cy="6866276"/>
+        </p:xfrm>
+        <a:graphic>
+          <a:graphicData uri="http://schemas.openxmlformats.org/drawingml/2006/table">
+            <a:tbl>
+              <a:tblPr>
+                <a:tableStyleId>{5C22544A-7EE6-4342-B048-85BDC9FD1C3A}</a:tableStyleId>
+              </a:tblPr>
+              <a:tblGrid>
+                <a:gridCol w="136116"/>
+                <a:gridCol w="2241368"/>
+                <a:gridCol w="2377484"/>
+                <a:gridCol w="510433"/>
+                <a:gridCol w="3539002"/>
+                <a:gridCol w="3477750"/>
+              </a:tblGrid>
+              <a:tr h="681647">
+                <a:tc>
+                  <a:txBody>
+                    <a:bodyPr/>
+                    <a:lstStyle/>
+                    <a:p>
+                      <a:pPr algn="ctr" fontAlgn="t"/>
+                      <a:r>
+                        <a:rPr lang="en-US" sz="1200" u="none" strike="noStrike" dirty="0">
+                          <a:effectLst/>
+                          <a:latin typeface="Tahoma" pitchFamily="34" charset="0"/>
+                          <a:ea typeface="Tahoma" pitchFamily="34" charset="0"/>
+                          <a:cs typeface="Tahoma" pitchFamily="34" charset="0"/>
+                        </a:rPr>
+                        <a:t>ID</a:t>
+                      </a:r>
+                      <a:endParaRPr lang="en-US" sz="1200" b="1" i="0" u="none" strike="noStrike" dirty="0">
+                        <a:solidFill>
+                          <a:srgbClr val="FFFFFF"/>
+                        </a:solidFill>
+                        <a:effectLst/>
+                        <a:latin typeface="Tahoma" pitchFamily="34" charset="0"/>
+                        <a:ea typeface="Tahoma" pitchFamily="34" charset="0"/>
+                        <a:cs typeface="Tahoma" pitchFamily="34" charset="0"/>
+                      </a:endParaRPr>
+                    </a:p>
+                  </a:txBody>
+                  <a:tcPr marL="5829" marR="5829" marT="5829" marB="0"/>
+                </a:tc>
+                <a:tc>
+                  <a:txBody>
+                    <a:bodyPr/>
+                    <a:lstStyle/>
+                    <a:p>
+                      <a:pPr algn="ctr" fontAlgn="t"/>
+                      <a:r>
+                        <a:rPr lang="en-US" sz="1200" u="none" strike="noStrike" dirty="0">
+                          <a:effectLst/>
+                          <a:latin typeface="Tahoma" pitchFamily="34" charset="0"/>
+                          <a:ea typeface="Tahoma" pitchFamily="34" charset="0"/>
+                          <a:cs typeface="Tahoma" pitchFamily="34" charset="0"/>
+                        </a:rPr>
+                        <a:t>Issue</a:t>
+                      </a:r>
+                      <a:endParaRPr lang="en-US" sz="1200" b="1" i="0" u="none" strike="noStrike" dirty="0">
+                        <a:solidFill>
+                          <a:srgbClr val="FFFFFF"/>
+                        </a:solidFill>
+                        <a:effectLst/>
+                        <a:latin typeface="Tahoma" pitchFamily="34" charset="0"/>
+                        <a:ea typeface="Tahoma" pitchFamily="34" charset="0"/>
+                        <a:cs typeface="Tahoma" pitchFamily="34" charset="0"/>
+                      </a:endParaRPr>
+                    </a:p>
+                  </a:txBody>
+                  <a:tcPr marL="5829" marR="5829" marT="5829" marB="0"/>
+                </a:tc>
+                <a:tc>
+                  <a:txBody>
+                    <a:bodyPr/>
+                    <a:lstStyle/>
+                    <a:p>
+                      <a:pPr algn="ctr" fontAlgn="t"/>
+                      <a:r>
+                        <a:rPr lang="en-US" sz="1200" u="none" strike="noStrike" dirty="0">
+                          <a:effectLst/>
+                          <a:latin typeface="Tahoma" pitchFamily="34" charset="0"/>
+                          <a:ea typeface="Tahoma" pitchFamily="34" charset="0"/>
+                          <a:cs typeface="Tahoma" pitchFamily="34" charset="0"/>
+                        </a:rPr>
+                        <a:t>Solution</a:t>
+                      </a:r>
+                      <a:endParaRPr lang="en-US" sz="1200" b="1" i="0" u="none" strike="noStrike" dirty="0">
+                        <a:solidFill>
+                          <a:srgbClr val="FFFFFF"/>
+                        </a:solidFill>
+                        <a:effectLst/>
+                        <a:latin typeface="Tahoma" pitchFamily="34" charset="0"/>
+                        <a:ea typeface="Tahoma" pitchFamily="34" charset="0"/>
+                        <a:cs typeface="Tahoma" pitchFamily="34" charset="0"/>
+                      </a:endParaRPr>
+                    </a:p>
+                  </a:txBody>
+                  <a:tcPr marL="5829" marR="5829" marT="5829" marB="0"/>
+                </a:tc>
+                <a:tc>
+                  <a:txBody>
+                    <a:bodyPr/>
+                    <a:lstStyle/>
+                    <a:p>
+                      <a:pPr algn="ctr" fontAlgn="t"/>
+                      <a:r>
+                        <a:rPr lang="en-US" sz="1200" u="none" strike="noStrike">
+                          <a:effectLst/>
+                          <a:latin typeface="Tahoma" pitchFamily="34" charset="0"/>
+                          <a:ea typeface="Tahoma" pitchFamily="34" charset="0"/>
+                          <a:cs typeface="Tahoma" pitchFamily="34" charset="0"/>
+                        </a:rPr>
+                        <a:t>Actual Status</a:t>
+                      </a:r>
+                      <a:endParaRPr lang="en-US" sz="1200" b="1" i="0" u="none" strike="noStrike">
+                        <a:solidFill>
+                          <a:srgbClr val="FFFFFF"/>
+                        </a:solidFill>
+                        <a:effectLst/>
+                        <a:latin typeface="Tahoma" pitchFamily="34" charset="0"/>
+                        <a:ea typeface="Tahoma" pitchFamily="34" charset="0"/>
+                        <a:cs typeface="Tahoma" pitchFamily="34" charset="0"/>
+                      </a:endParaRPr>
+                    </a:p>
+                  </a:txBody>
+                  <a:tcPr marL="5829" marR="5829" marT="5829" marB="0"/>
+                </a:tc>
+                <a:tc>
+                  <a:txBody>
+                    <a:bodyPr/>
+                    <a:lstStyle/>
+                    <a:p>
+                      <a:pPr algn="ctr" fontAlgn="t"/>
+                      <a:r>
+                        <a:rPr lang="en-US" sz="1200" u="none" strike="noStrike">
+                          <a:effectLst/>
+                          <a:latin typeface="Tahoma" pitchFamily="34" charset="0"/>
+                          <a:ea typeface="Tahoma" pitchFamily="34" charset="0"/>
+                          <a:cs typeface="Tahoma" pitchFamily="34" charset="0"/>
+                        </a:rPr>
+                        <a:t>Result</a:t>
+                      </a:r>
+                      <a:endParaRPr lang="en-US" sz="1200" b="1" i="0" u="none" strike="noStrike">
+                        <a:solidFill>
+                          <a:srgbClr val="FFFFFF"/>
+                        </a:solidFill>
+                        <a:effectLst/>
+                        <a:latin typeface="Tahoma" pitchFamily="34" charset="0"/>
+                        <a:ea typeface="Tahoma" pitchFamily="34" charset="0"/>
+                        <a:cs typeface="Tahoma" pitchFamily="34" charset="0"/>
+                      </a:endParaRPr>
+                    </a:p>
+                  </a:txBody>
+                  <a:tcPr marL="5829" marR="5829" marT="5829" marB="0"/>
+                </a:tc>
+                <a:tc>
+                  <a:txBody>
+                    <a:bodyPr/>
+                    <a:lstStyle/>
+                    <a:p>
+                      <a:pPr algn="ctr" fontAlgn="t"/>
+                      <a:r>
+                        <a:rPr lang="en-US" sz="1200" u="none" strike="noStrike">
+                          <a:effectLst/>
+                          <a:latin typeface="Tahoma" pitchFamily="34" charset="0"/>
+                          <a:ea typeface="Tahoma" pitchFamily="34" charset="0"/>
+                          <a:cs typeface="Tahoma" pitchFamily="34" charset="0"/>
+                        </a:rPr>
+                        <a:t>Lession Learned</a:t>
+                      </a:r>
+                      <a:endParaRPr lang="en-US" sz="1200" b="1" i="0" u="none" strike="noStrike">
+                        <a:solidFill>
+                          <a:srgbClr val="FFFFFF"/>
+                        </a:solidFill>
+                        <a:effectLst/>
+                        <a:latin typeface="Tahoma" pitchFamily="34" charset="0"/>
+                        <a:ea typeface="Tahoma" pitchFamily="34" charset="0"/>
+                        <a:cs typeface="Tahoma" pitchFamily="34" charset="0"/>
+                      </a:endParaRPr>
+                    </a:p>
+                  </a:txBody>
+                  <a:tcPr marL="5829" marR="5829" marT="5829" marB="0"/>
+                </a:tc>
+              </a:tr>
+              <a:tr h="726630">
+                <a:tc>
+                  <a:txBody>
+                    <a:bodyPr/>
+                    <a:lstStyle/>
+                    <a:p>
+                      <a:pPr algn="l" fontAlgn="t"/>
+                      <a:r>
+                        <a:rPr lang="en-US" sz="1200" u="none" strike="noStrike">
+                          <a:effectLst/>
+                          <a:latin typeface="Tahoma" pitchFamily="34" charset="0"/>
+                          <a:ea typeface="Tahoma" pitchFamily="34" charset="0"/>
+                          <a:cs typeface="Tahoma" pitchFamily="34" charset="0"/>
+                        </a:rPr>
+                        <a:t>1</a:t>
+                      </a:r>
+                      <a:endParaRPr lang="en-US" sz="1200" b="0" i="0" u="none" strike="noStrike">
+                        <a:solidFill>
+                          <a:srgbClr val="000000"/>
+                        </a:solidFill>
+                        <a:effectLst/>
+                        <a:latin typeface="Tahoma" pitchFamily="34" charset="0"/>
+                        <a:ea typeface="Tahoma" pitchFamily="34" charset="0"/>
+                        <a:cs typeface="Tahoma" pitchFamily="34" charset="0"/>
+                      </a:endParaRPr>
+                    </a:p>
+                  </a:txBody>
+                  <a:tcPr marL="5829" marR="5829" marT="5829" marB="0"/>
+                </a:tc>
+                <a:tc>
+                  <a:txBody>
+                    <a:bodyPr/>
+                    <a:lstStyle/>
+                    <a:p>
+                      <a:pPr algn="l" fontAlgn="t"/>
+                      <a:r>
+                        <a:rPr lang="en-US" sz="1200" u="none" strike="noStrike">
+                          <a:effectLst/>
+                          <a:latin typeface="Tahoma" pitchFamily="34" charset="0"/>
+                          <a:ea typeface="Tahoma" pitchFamily="34" charset="0"/>
+                          <a:cs typeface="Tahoma" pitchFamily="34" charset="0"/>
+                        </a:rPr>
+                        <a:t>Estimates are inaccurate</a:t>
+                      </a:r>
+                      <a:endParaRPr lang="en-US" sz="1200" b="0" i="0" u="none" strike="noStrike">
+                        <a:solidFill>
+                          <a:srgbClr val="000000"/>
+                        </a:solidFill>
+                        <a:effectLst/>
+                        <a:latin typeface="Tahoma" pitchFamily="34" charset="0"/>
+                        <a:ea typeface="Tahoma" pitchFamily="34" charset="0"/>
+                        <a:cs typeface="Tahoma" pitchFamily="34" charset="0"/>
+                      </a:endParaRPr>
+                    </a:p>
+                  </a:txBody>
+                  <a:tcPr marL="5829" marR="5829" marT="5829" marB="0"/>
+                </a:tc>
+                <a:tc>
+                  <a:txBody>
+                    <a:bodyPr/>
+                    <a:lstStyle/>
+                    <a:p>
+                      <a:pPr algn="l" fontAlgn="t"/>
+                      <a:r>
+                        <a:rPr lang="en-US" sz="1200" u="none" strike="noStrike">
+                          <a:effectLst/>
+                          <a:latin typeface="Tahoma" pitchFamily="34" charset="0"/>
+                          <a:ea typeface="Tahoma" pitchFamily="34" charset="0"/>
+                          <a:cs typeface="Tahoma" pitchFamily="34" charset="0"/>
+                        </a:rPr>
+                        <a:t>Team meeting and re-estimate.</a:t>
+                      </a:r>
+                      <a:endParaRPr lang="en-US" sz="1200" b="0" i="0" u="none" strike="noStrike">
+                        <a:solidFill>
+                          <a:srgbClr val="000000"/>
+                        </a:solidFill>
+                        <a:effectLst/>
+                        <a:latin typeface="Tahoma" pitchFamily="34" charset="0"/>
+                        <a:ea typeface="Tahoma" pitchFamily="34" charset="0"/>
+                        <a:cs typeface="Tahoma" pitchFamily="34" charset="0"/>
+                      </a:endParaRPr>
+                    </a:p>
+                  </a:txBody>
+                  <a:tcPr marL="5829" marR="5829" marT="5829" marB="0"/>
+                </a:tc>
+                <a:tc>
+                  <a:txBody>
+                    <a:bodyPr/>
+                    <a:lstStyle/>
+                    <a:p>
+                      <a:pPr algn="l" fontAlgn="t"/>
+                      <a:r>
+                        <a:rPr lang="en-US" sz="1200" u="none" strike="noStrike">
+                          <a:effectLst/>
+                          <a:latin typeface="Tahoma" pitchFamily="34" charset="0"/>
+                          <a:ea typeface="Tahoma" pitchFamily="34" charset="0"/>
+                          <a:cs typeface="Tahoma" pitchFamily="34" charset="0"/>
+                        </a:rPr>
+                        <a:t>Active</a:t>
+                      </a:r>
+                      <a:endParaRPr lang="en-US" sz="1200" b="0" i="0" u="none" strike="noStrike">
+                        <a:solidFill>
+                          <a:srgbClr val="000000"/>
+                        </a:solidFill>
+                        <a:effectLst/>
+                        <a:latin typeface="Tahoma" pitchFamily="34" charset="0"/>
+                        <a:ea typeface="Tahoma" pitchFamily="34" charset="0"/>
+                        <a:cs typeface="Tahoma" pitchFamily="34" charset="0"/>
+                      </a:endParaRPr>
+                    </a:p>
+                  </a:txBody>
+                  <a:tcPr marL="5829" marR="5829" marT="5829" marB="0"/>
+                </a:tc>
+                <a:tc>
+                  <a:txBody>
+                    <a:bodyPr/>
+                    <a:lstStyle/>
+                    <a:p>
+                      <a:pPr algn="l" fontAlgn="t"/>
+                      <a:r>
+                        <a:rPr lang="en-US" sz="1200" u="none" strike="noStrike">
+                          <a:effectLst/>
+                          <a:latin typeface="Tahoma" pitchFamily="34" charset="0"/>
+                          <a:ea typeface="Tahoma" pitchFamily="34" charset="0"/>
+                          <a:cs typeface="Tahoma" pitchFamily="34" charset="0"/>
+                        </a:rPr>
+                        <a:t>N/A</a:t>
+                      </a:r>
+                      <a:endParaRPr lang="en-US" sz="1200" b="0" i="0" u="none" strike="noStrike">
+                        <a:solidFill>
+                          <a:srgbClr val="000000"/>
+                        </a:solidFill>
+                        <a:effectLst/>
+                        <a:latin typeface="Tahoma" pitchFamily="34" charset="0"/>
+                        <a:ea typeface="Tahoma" pitchFamily="34" charset="0"/>
+                        <a:cs typeface="Tahoma" pitchFamily="34" charset="0"/>
+                      </a:endParaRPr>
+                    </a:p>
+                  </a:txBody>
+                  <a:tcPr marL="5829" marR="5829" marT="5829" marB="0"/>
+                </a:tc>
+                <a:tc>
+                  <a:txBody>
+                    <a:bodyPr/>
+                    <a:lstStyle/>
+                    <a:p>
+                      <a:pPr algn="l" fontAlgn="t"/>
+                      <a:r>
+                        <a:rPr lang="en-US" sz="1200" u="none" strike="noStrike">
+                          <a:effectLst/>
+                          <a:latin typeface="Tahoma" pitchFamily="34" charset="0"/>
+                          <a:ea typeface="Tahoma" pitchFamily="34" charset="0"/>
+                          <a:cs typeface="Tahoma" pitchFamily="34" charset="0"/>
+                        </a:rPr>
+                        <a:t>- Need to learn the method of estimating</a:t>
+                      </a:r>
+                      <a:br>
+                        <a:rPr lang="en-US" sz="1200" u="none" strike="noStrike">
+                          <a:effectLst/>
+                          <a:latin typeface="Tahoma" pitchFamily="34" charset="0"/>
+                          <a:ea typeface="Tahoma" pitchFamily="34" charset="0"/>
+                          <a:cs typeface="Tahoma" pitchFamily="34" charset="0"/>
+                        </a:rPr>
+                      </a:br>
+                      <a:r>
+                        <a:rPr lang="en-US" sz="1200" u="none" strike="noStrike">
+                          <a:effectLst/>
+                          <a:latin typeface="Tahoma" pitchFamily="34" charset="0"/>
+                          <a:ea typeface="Tahoma" pitchFamily="34" charset="0"/>
+                          <a:cs typeface="Tahoma" pitchFamily="34" charset="0"/>
+                        </a:rPr>
+                        <a:t>- Estimating together</a:t>
+                      </a:r>
+                      <a:endParaRPr lang="en-US" sz="1200" b="0" i="0" u="none" strike="noStrike">
+                        <a:solidFill>
+                          <a:srgbClr val="000000"/>
+                        </a:solidFill>
+                        <a:effectLst/>
+                        <a:latin typeface="Tahoma" pitchFamily="34" charset="0"/>
+                        <a:ea typeface="Tahoma" pitchFamily="34" charset="0"/>
+                        <a:cs typeface="Tahoma" pitchFamily="34" charset="0"/>
+                      </a:endParaRPr>
+                    </a:p>
+                  </a:txBody>
+                  <a:tcPr marL="5829" marR="5829" marT="5829" marB="0"/>
+                </a:tc>
+              </a:tr>
+              <a:tr h="726630">
+                <a:tc>
+                  <a:txBody>
+                    <a:bodyPr/>
+                    <a:lstStyle/>
+                    <a:p>
+                      <a:pPr algn="l" fontAlgn="t"/>
+                      <a:r>
+                        <a:rPr lang="en-US" sz="1200" u="none" strike="noStrike">
+                          <a:effectLst/>
+                          <a:latin typeface="Tahoma" pitchFamily="34" charset="0"/>
+                          <a:ea typeface="Tahoma" pitchFamily="34" charset="0"/>
+                          <a:cs typeface="Tahoma" pitchFamily="34" charset="0"/>
+                        </a:rPr>
+                        <a:t>2</a:t>
+                      </a:r>
+                      <a:endParaRPr lang="en-US" sz="1200" b="0" i="0" u="none" strike="noStrike">
+                        <a:solidFill>
+                          <a:srgbClr val="000000"/>
+                        </a:solidFill>
+                        <a:effectLst/>
+                        <a:latin typeface="Tahoma" pitchFamily="34" charset="0"/>
+                        <a:ea typeface="Tahoma" pitchFamily="34" charset="0"/>
+                        <a:cs typeface="Tahoma" pitchFamily="34" charset="0"/>
+                      </a:endParaRPr>
+                    </a:p>
+                  </a:txBody>
+                  <a:tcPr marL="5829" marR="5829" marT="5829" marB="0"/>
+                </a:tc>
+                <a:tc>
+                  <a:txBody>
+                    <a:bodyPr/>
+                    <a:lstStyle/>
+                    <a:p>
+                      <a:pPr algn="l" fontAlgn="t"/>
+                      <a:r>
+                        <a:rPr lang="en-US" sz="1200" u="none" strike="noStrike">
+                          <a:effectLst/>
+                          <a:latin typeface="Tahoma" pitchFamily="34" charset="0"/>
+                          <a:ea typeface="Tahoma" pitchFamily="34" charset="0"/>
+                          <a:cs typeface="Tahoma" pitchFamily="34" charset="0"/>
+                        </a:rPr>
+                        <a:t>Lack of needed knowledge</a:t>
+                      </a:r>
+                      <a:endParaRPr lang="en-US" sz="1200" b="0" i="0" u="none" strike="noStrike">
+                        <a:solidFill>
+                          <a:srgbClr val="000000"/>
+                        </a:solidFill>
+                        <a:effectLst/>
+                        <a:latin typeface="Tahoma" pitchFamily="34" charset="0"/>
+                        <a:ea typeface="Tahoma" pitchFamily="34" charset="0"/>
+                        <a:cs typeface="Tahoma" pitchFamily="34" charset="0"/>
+                      </a:endParaRPr>
+                    </a:p>
+                  </a:txBody>
+                  <a:tcPr marL="5829" marR="5829" marT="5829" marB="0"/>
+                </a:tc>
+                <a:tc>
+                  <a:txBody>
+                    <a:bodyPr/>
+                    <a:lstStyle/>
+                    <a:p>
+                      <a:pPr algn="l" fontAlgn="t"/>
+                      <a:r>
+                        <a:rPr lang="en-US" sz="1200" u="none" strike="noStrike">
+                          <a:effectLst/>
+                          <a:latin typeface="Tahoma" pitchFamily="34" charset="0"/>
+                          <a:ea typeface="Tahoma" pitchFamily="34" charset="0"/>
+                          <a:cs typeface="Tahoma" pitchFamily="34" charset="0"/>
+                        </a:rPr>
+                        <a:t>Research and increase effort to study new programming language.</a:t>
+                      </a:r>
+                      <a:endParaRPr lang="en-US" sz="1200" b="0" i="0" u="none" strike="noStrike">
+                        <a:solidFill>
+                          <a:srgbClr val="000000"/>
+                        </a:solidFill>
+                        <a:effectLst/>
+                        <a:latin typeface="Tahoma" pitchFamily="34" charset="0"/>
+                        <a:ea typeface="Tahoma" pitchFamily="34" charset="0"/>
+                        <a:cs typeface="Tahoma" pitchFamily="34" charset="0"/>
+                      </a:endParaRPr>
+                    </a:p>
+                  </a:txBody>
+                  <a:tcPr marL="5829" marR="5829" marT="5829" marB="0"/>
+                </a:tc>
+                <a:tc>
+                  <a:txBody>
+                    <a:bodyPr/>
+                    <a:lstStyle/>
+                    <a:p>
+                      <a:pPr algn="l" fontAlgn="t"/>
+                      <a:r>
+                        <a:rPr lang="en-US" sz="1200" u="none" strike="noStrike">
+                          <a:effectLst/>
+                          <a:latin typeface="Tahoma" pitchFamily="34" charset="0"/>
+                          <a:ea typeface="Tahoma" pitchFamily="34" charset="0"/>
+                          <a:cs typeface="Tahoma" pitchFamily="34" charset="0"/>
+                        </a:rPr>
+                        <a:t>Active</a:t>
+                      </a:r>
+                      <a:endParaRPr lang="en-US" sz="1200" b="0" i="0" u="none" strike="noStrike">
+                        <a:solidFill>
+                          <a:srgbClr val="000000"/>
+                        </a:solidFill>
+                        <a:effectLst/>
+                        <a:latin typeface="Tahoma" pitchFamily="34" charset="0"/>
+                        <a:ea typeface="Tahoma" pitchFamily="34" charset="0"/>
+                        <a:cs typeface="Tahoma" pitchFamily="34" charset="0"/>
+                      </a:endParaRPr>
+                    </a:p>
+                  </a:txBody>
+                  <a:tcPr marL="5829" marR="5829" marT="5829" marB="0"/>
+                </a:tc>
+                <a:tc>
+                  <a:txBody>
+                    <a:bodyPr/>
+                    <a:lstStyle/>
+                    <a:p>
+                      <a:pPr algn="l" fontAlgn="t"/>
+                      <a:r>
+                        <a:rPr lang="en-US" sz="1200" u="none" strike="noStrike">
+                          <a:effectLst/>
+                          <a:latin typeface="Tahoma" pitchFamily="34" charset="0"/>
+                          <a:ea typeface="Tahoma" pitchFamily="34" charset="0"/>
+                          <a:cs typeface="Tahoma" pitchFamily="34" charset="0"/>
+                        </a:rPr>
+                        <a:t>N/A</a:t>
+                      </a:r>
+                      <a:endParaRPr lang="en-US" sz="1200" b="0" i="0" u="none" strike="noStrike">
+                        <a:solidFill>
+                          <a:srgbClr val="000000"/>
+                        </a:solidFill>
+                        <a:effectLst/>
+                        <a:latin typeface="Tahoma" pitchFamily="34" charset="0"/>
+                        <a:ea typeface="Tahoma" pitchFamily="34" charset="0"/>
+                        <a:cs typeface="Tahoma" pitchFamily="34" charset="0"/>
+                      </a:endParaRPr>
+                    </a:p>
+                  </a:txBody>
+                  <a:tcPr marL="5829" marR="5829" marT="5829" marB="0"/>
+                </a:tc>
+                <a:tc>
+                  <a:txBody>
+                    <a:bodyPr/>
+                    <a:lstStyle/>
+                    <a:p>
+                      <a:pPr algn="l" fontAlgn="t"/>
+                      <a:r>
+                        <a:rPr lang="en-US" sz="1200" u="none" strike="noStrike">
+                          <a:effectLst/>
+                          <a:latin typeface="Tahoma" pitchFamily="34" charset="0"/>
+                          <a:ea typeface="Tahoma" pitchFamily="34" charset="0"/>
+                          <a:cs typeface="Tahoma" pitchFamily="34" charset="0"/>
+                        </a:rPr>
+                        <a:t>- Need to prepare the study materials at beginning</a:t>
+                      </a:r>
+                      <a:br>
+                        <a:rPr lang="en-US" sz="1200" u="none" strike="noStrike">
+                          <a:effectLst/>
+                          <a:latin typeface="Tahoma" pitchFamily="34" charset="0"/>
+                          <a:ea typeface="Tahoma" pitchFamily="34" charset="0"/>
+                          <a:cs typeface="Tahoma" pitchFamily="34" charset="0"/>
+                        </a:rPr>
+                      </a:br>
+                      <a:r>
+                        <a:rPr lang="en-US" sz="1200" u="none" strike="noStrike">
+                          <a:effectLst/>
+                          <a:latin typeface="Tahoma" pitchFamily="34" charset="0"/>
+                          <a:ea typeface="Tahoma" pitchFamily="34" charset="0"/>
+                          <a:cs typeface="Tahoma" pitchFamily="34" charset="0"/>
+                        </a:rPr>
+                        <a:t>- Need regular practice</a:t>
+                      </a:r>
+                      <a:endParaRPr lang="en-US" sz="1200" b="0" i="0" u="none" strike="noStrike">
+                        <a:solidFill>
+                          <a:srgbClr val="000000"/>
+                        </a:solidFill>
+                        <a:effectLst/>
+                        <a:latin typeface="Tahoma" pitchFamily="34" charset="0"/>
+                        <a:ea typeface="Tahoma" pitchFamily="34" charset="0"/>
+                        <a:cs typeface="Tahoma" pitchFamily="34" charset="0"/>
+                      </a:endParaRPr>
+                    </a:p>
+                  </a:txBody>
+                  <a:tcPr marL="5829" marR="5829" marT="5829" marB="0"/>
+                </a:tc>
+              </a:tr>
+              <a:tr h="726630">
+                <a:tc>
+                  <a:txBody>
+                    <a:bodyPr/>
+                    <a:lstStyle/>
+                    <a:p>
+                      <a:pPr algn="l" fontAlgn="t"/>
+                      <a:r>
+                        <a:rPr lang="en-US" sz="1200" u="none" strike="noStrike">
+                          <a:effectLst/>
+                          <a:latin typeface="Tahoma" pitchFamily="34" charset="0"/>
+                          <a:ea typeface="Tahoma" pitchFamily="34" charset="0"/>
+                          <a:cs typeface="Tahoma" pitchFamily="34" charset="0"/>
+                        </a:rPr>
+                        <a:t>3</a:t>
+                      </a:r>
+                      <a:endParaRPr lang="en-US" sz="1200" b="0" i="0" u="none" strike="noStrike">
+                        <a:solidFill>
+                          <a:srgbClr val="000000"/>
+                        </a:solidFill>
+                        <a:effectLst/>
+                        <a:latin typeface="Tahoma" pitchFamily="34" charset="0"/>
+                        <a:ea typeface="Tahoma" pitchFamily="34" charset="0"/>
+                        <a:cs typeface="Tahoma" pitchFamily="34" charset="0"/>
+                      </a:endParaRPr>
+                    </a:p>
+                  </a:txBody>
+                  <a:tcPr marL="5829" marR="5829" marT="5829" marB="0"/>
+                </a:tc>
+                <a:tc>
+                  <a:txBody>
+                    <a:bodyPr/>
+                    <a:lstStyle/>
+                    <a:p>
+                      <a:pPr algn="l" fontAlgn="t"/>
+                      <a:r>
+                        <a:rPr lang="en-US" sz="1200" u="none" strike="noStrike">
+                          <a:effectLst/>
+                          <a:latin typeface="Tahoma" pitchFamily="34" charset="0"/>
+                          <a:ea typeface="Tahoma" pitchFamily="34" charset="0"/>
+                          <a:cs typeface="Tahoma" pitchFamily="34" charset="0"/>
+                        </a:rPr>
+                        <a:t>Resources are inexperienced</a:t>
+                      </a:r>
+                      <a:endParaRPr lang="en-US" sz="1200" b="0" i="0" u="none" strike="noStrike">
+                        <a:solidFill>
+                          <a:srgbClr val="000000"/>
+                        </a:solidFill>
+                        <a:effectLst/>
+                        <a:latin typeface="Tahoma" pitchFamily="34" charset="0"/>
+                        <a:ea typeface="Tahoma" pitchFamily="34" charset="0"/>
+                        <a:cs typeface="Tahoma" pitchFamily="34" charset="0"/>
+                      </a:endParaRPr>
+                    </a:p>
+                  </a:txBody>
+                  <a:tcPr marL="5829" marR="5829" marT="5829" marB="0"/>
+                </a:tc>
+                <a:tc>
+                  <a:txBody>
+                    <a:bodyPr/>
+                    <a:lstStyle/>
+                    <a:p>
+                      <a:pPr algn="l" fontAlgn="t"/>
+                      <a:r>
+                        <a:rPr lang="en-US" sz="1200" u="none" strike="noStrike">
+                          <a:effectLst/>
+                          <a:latin typeface="Tahoma" pitchFamily="34" charset="0"/>
+                          <a:ea typeface="Tahoma" pitchFamily="34" charset="0"/>
+                          <a:cs typeface="Tahoma" pitchFamily="34" charset="0"/>
+                        </a:rPr>
+                        <a:t>All member research and read documents of previous course.</a:t>
+                      </a:r>
+                      <a:endParaRPr lang="en-US" sz="1200" b="0" i="0" u="none" strike="noStrike">
+                        <a:solidFill>
+                          <a:srgbClr val="000000"/>
+                        </a:solidFill>
+                        <a:effectLst/>
+                        <a:latin typeface="Tahoma" pitchFamily="34" charset="0"/>
+                        <a:ea typeface="Tahoma" pitchFamily="34" charset="0"/>
+                        <a:cs typeface="Tahoma" pitchFamily="34" charset="0"/>
+                      </a:endParaRPr>
+                    </a:p>
+                  </a:txBody>
+                  <a:tcPr marL="5829" marR="5829" marT="5829" marB="0"/>
+                </a:tc>
+                <a:tc>
+                  <a:txBody>
+                    <a:bodyPr/>
+                    <a:lstStyle/>
+                    <a:p>
+                      <a:pPr algn="l" fontAlgn="t"/>
+                      <a:r>
+                        <a:rPr lang="en-US" sz="1200" u="none" strike="noStrike">
+                          <a:effectLst/>
+                          <a:latin typeface="Tahoma" pitchFamily="34" charset="0"/>
+                          <a:ea typeface="Tahoma" pitchFamily="34" charset="0"/>
+                          <a:cs typeface="Tahoma" pitchFamily="34" charset="0"/>
+                        </a:rPr>
+                        <a:t>Fixed</a:t>
+                      </a:r>
+                      <a:endParaRPr lang="en-US" sz="1200" b="0" i="0" u="none" strike="noStrike">
+                        <a:solidFill>
+                          <a:srgbClr val="000000"/>
+                        </a:solidFill>
+                        <a:effectLst/>
+                        <a:latin typeface="Tahoma" pitchFamily="34" charset="0"/>
+                        <a:ea typeface="Tahoma" pitchFamily="34" charset="0"/>
+                        <a:cs typeface="Tahoma" pitchFamily="34" charset="0"/>
+                      </a:endParaRPr>
+                    </a:p>
+                  </a:txBody>
+                  <a:tcPr marL="5829" marR="5829" marT="5829" marB="0"/>
+                </a:tc>
+                <a:tc>
+                  <a:txBody>
+                    <a:bodyPr/>
+                    <a:lstStyle/>
+                    <a:p>
+                      <a:pPr algn="l" fontAlgn="t"/>
+                      <a:r>
+                        <a:rPr lang="en-US" sz="1200" u="none" strike="noStrike">
+                          <a:effectLst/>
+                          <a:latin typeface="Tahoma" pitchFamily="34" charset="0"/>
+                          <a:ea typeface="Tahoma" pitchFamily="34" charset="0"/>
+                          <a:cs typeface="Tahoma" pitchFamily="34" charset="0"/>
+                        </a:rPr>
+                        <a:t>Team members found a number of documents on the network &amp; previous course</a:t>
+                      </a:r>
+                      <a:endParaRPr lang="en-US" sz="1200" b="0" i="0" u="none" strike="noStrike">
+                        <a:solidFill>
+                          <a:srgbClr val="000000"/>
+                        </a:solidFill>
+                        <a:effectLst/>
+                        <a:latin typeface="Tahoma" pitchFamily="34" charset="0"/>
+                        <a:ea typeface="Tahoma" pitchFamily="34" charset="0"/>
+                        <a:cs typeface="Tahoma" pitchFamily="34" charset="0"/>
+                      </a:endParaRPr>
+                    </a:p>
+                  </a:txBody>
+                  <a:tcPr marL="5829" marR="5829" marT="5829" marB="0"/>
+                </a:tc>
+                <a:tc>
+                  <a:txBody>
+                    <a:bodyPr/>
+                    <a:lstStyle/>
+                    <a:p>
+                      <a:pPr algn="l" fontAlgn="t"/>
+                      <a:r>
+                        <a:rPr lang="en-US" sz="1200" u="none" strike="noStrike">
+                          <a:effectLst/>
+                          <a:latin typeface="Tahoma" pitchFamily="34" charset="0"/>
+                          <a:ea typeface="Tahoma" pitchFamily="34" charset="0"/>
+                          <a:cs typeface="Tahoma" pitchFamily="34" charset="0"/>
+                        </a:rPr>
+                        <a:t>- Need to prepare the study materials from the beginning</a:t>
+                      </a:r>
+                      <a:endParaRPr lang="en-US" sz="1200" b="0" i="0" u="none" strike="noStrike">
+                        <a:solidFill>
+                          <a:srgbClr val="000000"/>
+                        </a:solidFill>
+                        <a:effectLst/>
+                        <a:latin typeface="Tahoma" pitchFamily="34" charset="0"/>
+                        <a:ea typeface="Tahoma" pitchFamily="34" charset="0"/>
+                        <a:cs typeface="Tahoma" pitchFamily="34" charset="0"/>
+                      </a:endParaRPr>
+                    </a:p>
+                  </a:txBody>
+                  <a:tcPr marL="5829" marR="5829" marT="5829" marB="0"/>
+                </a:tc>
+              </a:tr>
+              <a:tr h="726630">
+                <a:tc>
+                  <a:txBody>
+                    <a:bodyPr/>
+                    <a:lstStyle/>
+                    <a:p>
+                      <a:pPr algn="l" fontAlgn="t"/>
+                      <a:r>
+                        <a:rPr lang="en-US" sz="1200" u="none" strike="noStrike">
+                          <a:effectLst/>
+                          <a:latin typeface="Tahoma" pitchFamily="34" charset="0"/>
+                          <a:ea typeface="Tahoma" pitchFamily="34" charset="0"/>
+                          <a:cs typeface="Tahoma" pitchFamily="34" charset="0"/>
+                        </a:rPr>
+                        <a:t>4</a:t>
+                      </a:r>
+                      <a:endParaRPr lang="en-US" sz="1200" b="0" i="0" u="none" strike="noStrike">
+                        <a:solidFill>
+                          <a:srgbClr val="000000"/>
+                        </a:solidFill>
+                        <a:effectLst/>
+                        <a:latin typeface="Tahoma" pitchFamily="34" charset="0"/>
+                        <a:ea typeface="Tahoma" pitchFamily="34" charset="0"/>
+                        <a:cs typeface="Tahoma" pitchFamily="34" charset="0"/>
+                      </a:endParaRPr>
+                    </a:p>
+                  </a:txBody>
+                  <a:tcPr marL="5829" marR="5829" marT="5829" marB="0"/>
+                </a:tc>
+                <a:tc>
+                  <a:txBody>
+                    <a:bodyPr/>
+                    <a:lstStyle/>
+                    <a:p>
+                      <a:pPr algn="l" fontAlgn="t"/>
+                      <a:r>
+                        <a:rPr lang="en-US" sz="1200" u="none" strike="noStrike">
+                          <a:effectLst/>
+                          <a:latin typeface="Tahoma" pitchFamily="34" charset="0"/>
+                          <a:ea typeface="Tahoma" pitchFamily="34" charset="0"/>
+                          <a:cs typeface="Tahoma" pitchFamily="34" charset="0"/>
+                        </a:rPr>
+                        <a:t>Errors in key project management processes</a:t>
+                      </a:r>
+                      <a:endParaRPr lang="en-US" sz="1200" b="0" i="0" u="none" strike="noStrike">
+                        <a:solidFill>
+                          <a:srgbClr val="000000"/>
+                        </a:solidFill>
+                        <a:effectLst/>
+                        <a:latin typeface="Tahoma" pitchFamily="34" charset="0"/>
+                        <a:ea typeface="Tahoma" pitchFamily="34" charset="0"/>
+                        <a:cs typeface="Tahoma" pitchFamily="34" charset="0"/>
+                      </a:endParaRPr>
+                    </a:p>
+                  </a:txBody>
+                  <a:tcPr marL="5829" marR="5829" marT="5829" marB="0"/>
+                </a:tc>
+                <a:tc>
+                  <a:txBody>
+                    <a:bodyPr/>
+                    <a:lstStyle/>
+                    <a:p>
+                      <a:pPr algn="l" fontAlgn="t"/>
+                      <a:r>
+                        <a:rPr lang="en-US" sz="1200" u="none" strike="noStrike">
+                          <a:effectLst/>
+                          <a:latin typeface="Tahoma" pitchFamily="34" charset="0"/>
+                          <a:ea typeface="Tahoma" pitchFamily="34" charset="0"/>
+                          <a:cs typeface="Tahoma" pitchFamily="34" charset="0"/>
+                        </a:rPr>
+                        <a:t>Team meeting to review each key process and modify them.</a:t>
+                      </a:r>
+                      <a:endParaRPr lang="en-US" sz="1200" b="0" i="0" u="none" strike="noStrike">
+                        <a:solidFill>
+                          <a:srgbClr val="000000"/>
+                        </a:solidFill>
+                        <a:effectLst/>
+                        <a:latin typeface="Tahoma" pitchFamily="34" charset="0"/>
+                        <a:ea typeface="Tahoma" pitchFamily="34" charset="0"/>
+                        <a:cs typeface="Tahoma" pitchFamily="34" charset="0"/>
+                      </a:endParaRPr>
+                    </a:p>
+                  </a:txBody>
+                  <a:tcPr marL="5829" marR="5829" marT="5829" marB="0"/>
+                </a:tc>
+                <a:tc>
+                  <a:txBody>
+                    <a:bodyPr/>
+                    <a:lstStyle/>
+                    <a:p>
+                      <a:pPr algn="l" fontAlgn="t"/>
+                      <a:r>
+                        <a:rPr lang="en-US" sz="1200" u="none" strike="noStrike">
+                          <a:effectLst/>
+                          <a:latin typeface="Tahoma" pitchFamily="34" charset="0"/>
+                          <a:ea typeface="Tahoma" pitchFamily="34" charset="0"/>
+                          <a:cs typeface="Tahoma" pitchFamily="34" charset="0"/>
+                        </a:rPr>
+                        <a:t>Fixed</a:t>
+                      </a:r>
+                      <a:endParaRPr lang="en-US" sz="1200" b="0" i="0" u="none" strike="noStrike">
+                        <a:solidFill>
+                          <a:srgbClr val="000000"/>
+                        </a:solidFill>
+                        <a:effectLst/>
+                        <a:latin typeface="Tahoma" pitchFamily="34" charset="0"/>
+                        <a:ea typeface="Tahoma" pitchFamily="34" charset="0"/>
+                        <a:cs typeface="Tahoma" pitchFamily="34" charset="0"/>
+                      </a:endParaRPr>
+                    </a:p>
+                  </a:txBody>
+                  <a:tcPr marL="5829" marR="5829" marT="5829" marB="0"/>
+                </a:tc>
+                <a:tc>
+                  <a:txBody>
+                    <a:bodyPr/>
+                    <a:lstStyle/>
+                    <a:p>
+                      <a:pPr algn="l" fontAlgn="t"/>
+                      <a:r>
+                        <a:rPr lang="en-US" sz="1200" u="none" strike="noStrike">
+                          <a:effectLst/>
+                          <a:latin typeface="Tahoma" pitchFamily="34" charset="0"/>
+                          <a:ea typeface="Tahoma" pitchFamily="34" charset="0"/>
+                          <a:cs typeface="Tahoma" pitchFamily="34" charset="0"/>
+                        </a:rPr>
+                        <a:t>Modify all document templates</a:t>
+                      </a:r>
+                      <a:br>
+                        <a:rPr lang="en-US" sz="1200" u="none" strike="noStrike">
+                          <a:effectLst/>
+                          <a:latin typeface="Tahoma" pitchFamily="34" charset="0"/>
+                          <a:ea typeface="Tahoma" pitchFamily="34" charset="0"/>
+                          <a:cs typeface="Tahoma" pitchFamily="34" charset="0"/>
+                        </a:rPr>
+                      </a:br>
+                      <a:r>
+                        <a:rPr lang="en-US" sz="1200" u="none" strike="noStrike">
+                          <a:effectLst/>
+                          <a:latin typeface="Tahoma" pitchFamily="34" charset="0"/>
+                          <a:ea typeface="Tahoma" pitchFamily="34" charset="0"/>
+                          <a:cs typeface="Tahoma" pitchFamily="34" charset="0"/>
+                        </a:rPr>
+                        <a:t>Synchronize all processes</a:t>
+                      </a:r>
+                      <a:endParaRPr lang="en-US" sz="1200" b="0" i="0" u="none" strike="noStrike">
+                        <a:solidFill>
+                          <a:srgbClr val="000000"/>
+                        </a:solidFill>
+                        <a:effectLst/>
+                        <a:latin typeface="Tahoma" pitchFamily="34" charset="0"/>
+                        <a:ea typeface="Tahoma" pitchFamily="34" charset="0"/>
+                        <a:cs typeface="Tahoma" pitchFamily="34" charset="0"/>
+                      </a:endParaRPr>
+                    </a:p>
+                  </a:txBody>
+                  <a:tcPr marL="5829" marR="5829" marT="5829" marB="0"/>
+                </a:tc>
+                <a:tc>
+                  <a:txBody>
+                    <a:bodyPr/>
+                    <a:lstStyle/>
+                    <a:p>
+                      <a:pPr algn="l" fontAlgn="t"/>
+                      <a:r>
+                        <a:rPr lang="en-US" sz="1200" u="none" strike="noStrike">
+                          <a:effectLst/>
+                          <a:latin typeface="Tahoma" pitchFamily="34" charset="0"/>
+                          <a:ea typeface="Tahoma" pitchFamily="34" charset="0"/>
+                          <a:cs typeface="Tahoma" pitchFamily="34" charset="0"/>
+                        </a:rPr>
+                        <a:t>- Modify all document templates at beginning</a:t>
+                      </a:r>
+                      <a:br>
+                        <a:rPr lang="en-US" sz="1200" u="none" strike="noStrike">
+                          <a:effectLst/>
+                          <a:latin typeface="Tahoma" pitchFamily="34" charset="0"/>
+                          <a:ea typeface="Tahoma" pitchFamily="34" charset="0"/>
+                          <a:cs typeface="Tahoma" pitchFamily="34" charset="0"/>
+                        </a:rPr>
+                      </a:br>
+                      <a:r>
+                        <a:rPr lang="en-US" sz="1200" u="none" strike="noStrike">
+                          <a:effectLst/>
+                          <a:latin typeface="Tahoma" pitchFamily="34" charset="0"/>
+                          <a:ea typeface="Tahoma" pitchFamily="34" charset="0"/>
+                          <a:cs typeface="Tahoma" pitchFamily="34" charset="0"/>
+                        </a:rPr>
+                        <a:t>- Draw process with one configuration</a:t>
+                      </a:r>
+                      <a:endParaRPr lang="en-US" sz="1200" b="0" i="0" u="none" strike="noStrike">
+                        <a:solidFill>
+                          <a:srgbClr val="000000"/>
+                        </a:solidFill>
+                        <a:effectLst/>
+                        <a:latin typeface="Tahoma" pitchFamily="34" charset="0"/>
+                        <a:ea typeface="Tahoma" pitchFamily="34" charset="0"/>
+                        <a:cs typeface="Tahoma" pitchFamily="34" charset="0"/>
+                      </a:endParaRPr>
+                    </a:p>
+                  </a:txBody>
+                  <a:tcPr marL="5829" marR="5829" marT="5829" marB="0"/>
+                </a:tc>
+              </a:tr>
+              <a:tr h="726630">
+                <a:tc>
+                  <a:txBody>
+                    <a:bodyPr/>
+                    <a:lstStyle/>
+                    <a:p>
+                      <a:pPr algn="l" fontAlgn="t"/>
+                      <a:r>
+                        <a:rPr lang="en-US" sz="1200" u="none" strike="noStrike">
+                          <a:effectLst/>
+                          <a:latin typeface="Tahoma" pitchFamily="34" charset="0"/>
+                          <a:ea typeface="Tahoma" pitchFamily="34" charset="0"/>
+                          <a:cs typeface="Tahoma" pitchFamily="34" charset="0"/>
+                        </a:rPr>
+                        <a:t>5</a:t>
+                      </a:r>
+                      <a:endParaRPr lang="en-US" sz="1200" b="0" i="0" u="none" strike="noStrike">
+                        <a:solidFill>
+                          <a:srgbClr val="000000"/>
+                        </a:solidFill>
+                        <a:effectLst/>
+                        <a:latin typeface="Tahoma" pitchFamily="34" charset="0"/>
+                        <a:ea typeface="Tahoma" pitchFamily="34" charset="0"/>
+                        <a:cs typeface="Tahoma" pitchFamily="34" charset="0"/>
+                      </a:endParaRPr>
+                    </a:p>
+                  </a:txBody>
+                  <a:tcPr marL="5829" marR="5829" marT="5829" marB="0"/>
+                </a:tc>
+                <a:tc>
+                  <a:txBody>
+                    <a:bodyPr/>
+                    <a:lstStyle/>
+                    <a:p>
+                      <a:pPr algn="l" fontAlgn="t"/>
+                      <a:r>
+                        <a:rPr lang="en-US" sz="1200" u="none" strike="noStrike">
+                          <a:effectLst/>
+                          <a:latin typeface="Tahoma" pitchFamily="34" charset="0"/>
+                          <a:ea typeface="Tahoma" pitchFamily="34" charset="0"/>
+                          <a:cs typeface="Tahoma" pitchFamily="34" charset="0"/>
+                        </a:rPr>
+                        <a:t>Team members with negative attitudes towards the project</a:t>
+                      </a:r>
+                      <a:endParaRPr lang="en-US" sz="1200" b="0" i="0" u="none" strike="noStrike">
+                        <a:solidFill>
+                          <a:srgbClr val="000000"/>
+                        </a:solidFill>
+                        <a:effectLst/>
+                        <a:latin typeface="Tahoma" pitchFamily="34" charset="0"/>
+                        <a:ea typeface="Tahoma" pitchFamily="34" charset="0"/>
+                        <a:cs typeface="Tahoma" pitchFamily="34" charset="0"/>
+                      </a:endParaRPr>
+                    </a:p>
+                  </a:txBody>
+                  <a:tcPr marL="5829" marR="5829" marT="5829" marB="0"/>
+                </a:tc>
+                <a:tc>
+                  <a:txBody>
+                    <a:bodyPr/>
+                    <a:lstStyle/>
+                    <a:p>
+                      <a:pPr algn="l" fontAlgn="t"/>
+                      <a:r>
+                        <a:rPr lang="en-US" sz="1200" u="none" strike="noStrike">
+                          <a:effectLst/>
+                          <a:latin typeface="Tahoma" pitchFamily="34" charset="0"/>
+                          <a:ea typeface="Tahoma" pitchFamily="34" charset="0"/>
+                          <a:cs typeface="Tahoma" pitchFamily="34" charset="0"/>
+                        </a:rPr>
+                        <a:t>Team meeting to solve the problem.</a:t>
+                      </a:r>
+                      <a:endParaRPr lang="en-US" sz="1200" b="0" i="0" u="none" strike="noStrike">
+                        <a:solidFill>
+                          <a:srgbClr val="000000"/>
+                        </a:solidFill>
+                        <a:effectLst/>
+                        <a:latin typeface="Tahoma" pitchFamily="34" charset="0"/>
+                        <a:ea typeface="Tahoma" pitchFamily="34" charset="0"/>
+                        <a:cs typeface="Tahoma" pitchFamily="34" charset="0"/>
+                      </a:endParaRPr>
+                    </a:p>
+                  </a:txBody>
+                  <a:tcPr marL="5829" marR="5829" marT="5829" marB="0"/>
+                </a:tc>
+                <a:tc>
+                  <a:txBody>
+                    <a:bodyPr/>
+                    <a:lstStyle/>
+                    <a:p>
+                      <a:pPr algn="l" fontAlgn="t"/>
+                      <a:r>
+                        <a:rPr lang="en-US" sz="1200" u="none" strike="noStrike">
+                          <a:effectLst/>
+                          <a:latin typeface="Tahoma" pitchFamily="34" charset="0"/>
+                          <a:ea typeface="Tahoma" pitchFamily="34" charset="0"/>
+                          <a:cs typeface="Tahoma" pitchFamily="34" charset="0"/>
+                        </a:rPr>
+                        <a:t>Fixed</a:t>
+                      </a:r>
+                      <a:endParaRPr lang="en-US" sz="1200" b="0" i="0" u="none" strike="noStrike">
+                        <a:solidFill>
+                          <a:srgbClr val="000000"/>
+                        </a:solidFill>
+                        <a:effectLst/>
+                        <a:latin typeface="Tahoma" pitchFamily="34" charset="0"/>
+                        <a:ea typeface="Tahoma" pitchFamily="34" charset="0"/>
+                        <a:cs typeface="Tahoma" pitchFamily="34" charset="0"/>
+                      </a:endParaRPr>
+                    </a:p>
+                  </a:txBody>
+                  <a:tcPr marL="5829" marR="5829" marT="5829" marB="0"/>
+                </a:tc>
+                <a:tc>
+                  <a:txBody>
+                    <a:bodyPr/>
+                    <a:lstStyle/>
+                    <a:p>
+                      <a:pPr algn="l" fontAlgn="t"/>
+                      <a:r>
+                        <a:rPr lang="en-US" sz="1200" u="none" strike="noStrike">
+                          <a:effectLst/>
+                          <a:latin typeface="Tahoma" pitchFamily="34" charset="0"/>
+                          <a:ea typeface="Tahoma" pitchFamily="34" charset="0"/>
+                          <a:cs typeface="Tahoma" pitchFamily="34" charset="0"/>
+                        </a:rPr>
+                        <a:t>Have some team building to improve motivation of team work</a:t>
+                      </a:r>
+                      <a:br>
+                        <a:rPr lang="en-US" sz="1200" u="none" strike="noStrike">
+                          <a:effectLst/>
+                          <a:latin typeface="Tahoma" pitchFamily="34" charset="0"/>
+                          <a:ea typeface="Tahoma" pitchFamily="34" charset="0"/>
+                          <a:cs typeface="Tahoma" pitchFamily="34" charset="0"/>
+                        </a:rPr>
+                      </a:br>
+                      <a:r>
+                        <a:rPr lang="en-US" sz="1200" u="none" strike="noStrike">
+                          <a:effectLst/>
+                          <a:latin typeface="Tahoma" pitchFamily="34" charset="0"/>
+                          <a:ea typeface="Tahoma" pitchFamily="34" charset="0"/>
+                          <a:cs typeface="Tahoma" pitchFamily="34" charset="0"/>
+                        </a:rPr>
+                        <a:t>Team focused and eager to work together</a:t>
+                      </a:r>
+                      <a:endParaRPr lang="en-US" sz="1200" b="0" i="0" u="none" strike="noStrike">
+                        <a:solidFill>
+                          <a:srgbClr val="000000"/>
+                        </a:solidFill>
+                        <a:effectLst/>
+                        <a:latin typeface="Tahoma" pitchFamily="34" charset="0"/>
+                        <a:ea typeface="Tahoma" pitchFamily="34" charset="0"/>
+                        <a:cs typeface="Tahoma" pitchFamily="34" charset="0"/>
+                      </a:endParaRPr>
+                    </a:p>
+                  </a:txBody>
+                  <a:tcPr marL="5829" marR="5829" marT="5829" marB="0"/>
+                </a:tc>
+                <a:tc>
+                  <a:txBody>
+                    <a:bodyPr/>
+                    <a:lstStyle/>
+                    <a:p>
+                      <a:pPr algn="l" fontAlgn="t"/>
+                      <a:r>
+                        <a:rPr lang="en-US" sz="1200" u="none" strike="noStrike">
+                          <a:effectLst/>
+                          <a:latin typeface="Tahoma" pitchFamily="34" charset="0"/>
+                          <a:ea typeface="Tahoma" pitchFamily="34" charset="0"/>
+                          <a:cs typeface="Tahoma" pitchFamily="34" charset="0"/>
+                        </a:rPr>
+                        <a:t>- Member of team should respect each other</a:t>
+                      </a:r>
+                      <a:br>
+                        <a:rPr lang="en-US" sz="1200" u="none" strike="noStrike">
+                          <a:effectLst/>
+                          <a:latin typeface="Tahoma" pitchFamily="34" charset="0"/>
+                          <a:ea typeface="Tahoma" pitchFamily="34" charset="0"/>
+                          <a:cs typeface="Tahoma" pitchFamily="34" charset="0"/>
+                        </a:rPr>
+                      </a:br>
+                      <a:r>
+                        <a:rPr lang="en-US" sz="1200" u="none" strike="noStrike">
+                          <a:effectLst/>
+                          <a:latin typeface="Tahoma" pitchFamily="34" charset="0"/>
+                          <a:ea typeface="Tahoma" pitchFamily="34" charset="0"/>
+                          <a:cs typeface="Tahoma" pitchFamily="34" charset="0"/>
+                        </a:rPr>
+                        <a:t>- Prioritize work on top</a:t>
+                      </a:r>
+                      <a:endParaRPr lang="en-US" sz="1200" b="0" i="0" u="none" strike="noStrike">
+                        <a:solidFill>
+                          <a:srgbClr val="000000"/>
+                        </a:solidFill>
+                        <a:effectLst/>
+                        <a:latin typeface="Tahoma" pitchFamily="34" charset="0"/>
+                        <a:ea typeface="Tahoma" pitchFamily="34" charset="0"/>
+                        <a:cs typeface="Tahoma" pitchFamily="34" charset="0"/>
+                      </a:endParaRPr>
+                    </a:p>
+                  </a:txBody>
+                  <a:tcPr marL="5829" marR="5829" marT="5829" marB="0"/>
+                </a:tc>
+              </a:tr>
+              <a:tr h="726630">
+                <a:tc>
+                  <a:txBody>
+                    <a:bodyPr/>
+                    <a:lstStyle/>
+                    <a:p>
+                      <a:pPr algn="l" fontAlgn="t"/>
+                      <a:r>
+                        <a:rPr lang="en-US" sz="1200" u="none" strike="noStrike">
+                          <a:effectLst/>
+                          <a:latin typeface="Tahoma" pitchFamily="34" charset="0"/>
+                          <a:ea typeface="Tahoma" pitchFamily="34" charset="0"/>
+                          <a:cs typeface="Tahoma" pitchFamily="34" charset="0"/>
+                        </a:rPr>
+                        <a:t>6</a:t>
+                      </a:r>
+                      <a:endParaRPr lang="en-US" sz="1200" b="0" i="0" u="none" strike="noStrike">
+                        <a:solidFill>
+                          <a:srgbClr val="000000"/>
+                        </a:solidFill>
+                        <a:effectLst/>
+                        <a:latin typeface="Tahoma" pitchFamily="34" charset="0"/>
+                        <a:ea typeface="Tahoma" pitchFamily="34" charset="0"/>
+                        <a:cs typeface="Tahoma" pitchFamily="34" charset="0"/>
+                      </a:endParaRPr>
+                    </a:p>
+                  </a:txBody>
+                  <a:tcPr marL="5829" marR="5829" marT="5829" marB="0"/>
+                </a:tc>
+                <a:tc>
+                  <a:txBody>
+                    <a:bodyPr/>
+                    <a:lstStyle/>
+                    <a:p>
+                      <a:pPr algn="l" fontAlgn="t"/>
+                      <a:r>
+                        <a:rPr lang="en-US" sz="1200" u="none" strike="noStrike">
+                          <a:effectLst/>
+                          <a:latin typeface="Tahoma" pitchFamily="34" charset="0"/>
+                          <a:ea typeface="Tahoma" pitchFamily="34" charset="0"/>
+                          <a:cs typeface="Tahoma" pitchFamily="34" charset="0"/>
+                        </a:rPr>
+                        <a:t>Inaccurate function priorities</a:t>
+                      </a:r>
+                      <a:endParaRPr lang="en-US" sz="1200" b="0" i="0" u="none" strike="noStrike">
+                        <a:solidFill>
+                          <a:srgbClr val="000000"/>
+                        </a:solidFill>
+                        <a:effectLst/>
+                        <a:latin typeface="Tahoma" pitchFamily="34" charset="0"/>
+                        <a:ea typeface="Tahoma" pitchFamily="34" charset="0"/>
+                        <a:cs typeface="Tahoma" pitchFamily="34" charset="0"/>
+                      </a:endParaRPr>
+                    </a:p>
+                  </a:txBody>
+                  <a:tcPr marL="5829" marR="5829" marT="5829" marB="0"/>
+                </a:tc>
+                <a:tc>
+                  <a:txBody>
+                    <a:bodyPr/>
+                    <a:lstStyle/>
+                    <a:p>
+                      <a:pPr algn="l" fontAlgn="t"/>
+                      <a:r>
+                        <a:rPr lang="en-US" sz="1200" u="none" strike="noStrike">
+                          <a:effectLst/>
+                          <a:latin typeface="Tahoma" pitchFamily="34" charset="0"/>
+                          <a:ea typeface="Tahoma" pitchFamily="34" charset="0"/>
+                          <a:cs typeface="Tahoma" pitchFamily="34" charset="0"/>
+                        </a:rPr>
+                        <a:t>Review with customer to define clearly for function priorities.</a:t>
+                      </a:r>
+                      <a:endParaRPr lang="en-US" sz="1200" b="0" i="0" u="none" strike="noStrike">
+                        <a:solidFill>
+                          <a:srgbClr val="000000"/>
+                        </a:solidFill>
+                        <a:effectLst/>
+                        <a:latin typeface="Tahoma" pitchFamily="34" charset="0"/>
+                        <a:ea typeface="Tahoma" pitchFamily="34" charset="0"/>
+                        <a:cs typeface="Tahoma" pitchFamily="34" charset="0"/>
+                      </a:endParaRPr>
+                    </a:p>
+                  </a:txBody>
+                  <a:tcPr marL="5829" marR="5829" marT="5829" marB="0"/>
+                </a:tc>
+                <a:tc>
+                  <a:txBody>
+                    <a:bodyPr/>
+                    <a:lstStyle/>
+                    <a:p>
+                      <a:pPr algn="l" fontAlgn="t"/>
+                      <a:r>
+                        <a:rPr lang="en-US" sz="1200" u="none" strike="noStrike">
+                          <a:effectLst/>
+                          <a:latin typeface="Tahoma" pitchFamily="34" charset="0"/>
+                          <a:ea typeface="Tahoma" pitchFamily="34" charset="0"/>
+                          <a:cs typeface="Tahoma" pitchFamily="34" charset="0"/>
+                        </a:rPr>
+                        <a:t>Fixed</a:t>
+                      </a:r>
+                      <a:endParaRPr lang="en-US" sz="1200" b="0" i="0" u="none" strike="noStrike">
+                        <a:solidFill>
+                          <a:srgbClr val="000000"/>
+                        </a:solidFill>
+                        <a:effectLst/>
+                        <a:latin typeface="Tahoma" pitchFamily="34" charset="0"/>
+                        <a:ea typeface="Tahoma" pitchFamily="34" charset="0"/>
+                        <a:cs typeface="Tahoma" pitchFamily="34" charset="0"/>
+                      </a:endParaRPr>
+                    </a:p>
+                  </a:txBody>
+                  <a:tcPr marL="5829" marR="5829" marT="5829" marB="0"/>
+                </a:tc>
+                <a:tc>
+                  <a:txBody>
+                    <a:bodyPr/>
+                    <a:lstStyle/>
+                    <a:p>
+                      <a:pPr algn="l" fontAlgn="t"/>
+                      <a:r>
+                        <a:rPr lang="en-US" sz="1200" u="none" strike="noStrike">
+                          <a:effectLst/>
+                          <a:latin typeface="Tahoma" pitchFamily="34" charset="0"/>
+                          <a:ea typeface="Tahoma" pitchFamily="34" charset="0"/>
+                          <a:cs typeface="Tahoma" pitchFamily="34" charset="0"/>
+                        </a:rPr>
+                        <a:t>Reviewed priorities of all function</a:t>
+                      </a:r>
+                      <a:endParaRPr lang="en-US" sz="1200" b="0" i="0" u="none" strike="noStrike">
+                        <a:solidFill>
+                          <a:srgbClr val="000000"/>
+                        </a:solidFill>
+                        <a:effectLst/>
+                        <a:latin typeface="Tahoma" pitchFamily="34" charset="0"/>
+                        <a:ea typeface="Tahoma" pitchFamily="34" charset="0"/>
+                        <a:cs typeface="Tahoma" pitchFamily="34" charset="0"/>
+                      </a:endParaRPr>
+                    </a:p>
+                  </a:txBody>
+                  <a:tcPr marL="5829" marR="5829" marT="5829" marB="0"/>
+                </a:tc>
+                <a:tc>
+                  <a:txBody>
+                    <a:bodyPr/>
+                    <a:lstStyle/>
+                    <a:p>
+                      <a:pPr algn="l" fontAlgn="t"/>
+                      <a:r>
+                        <a:rPr lang="en-US" sz="1200" u="none" strike="noStrike">
+                          <a:effectLst/>
+                          <a:latin typeface="Tahoma" pitchFamily="34" charset="0"/>
+                          <a:ea typeface="Tahoma" pitchFamily="34" charset="0"/>
+                          <a:cs typeface="Tahoma" pitchFamily="34" charset="0"/>
+                        </a:rPr>
+                        <a:t>- Need understand clearly about requirement of customer</a:t>
+                      </a:r>
+                      <a:endParaRPr lang="en-US" sz="1200" b="0" i="0" u="none" strike="noStrike">
+                        <a:solidFill>
+                          <a:srgbClr val="000000"/>
+                        </a:solidFill>
+                        <a:effectLst/>
+                        <a:latin typeface="Tahoma" pitchFamily="34" charset="0"/>
+                        <a:ea typeface="Tahoma" pitchFamily="34" charset="0"/>
+                        <a:cs typeface="Tahoma" pitchFamily="34" charset="0"/>
+                      </a:endParaRPr>
+                    </a:p>
+                  </a:txBody>
+                  <a:tcPr marL="5829" marR="5829" marT="5829" marB="0"/>
+                </a:tc>
+              </a:tr>
+              <a:tr h="726630">
+                <a:tc>
+                  <a:txBody>
+                    <a:bodyPr/>
+                    <a:lstStyle/>
+                    <a:p>
+                      <a:pPr algn="l" fontAlgn="t"/>
+                      <a:r>
+                        <a:rPr lang="en-US" sz="1200" u="none" strike="noStrike">
+                          <a:effectLst/>
+                          <a:latin typeface="Tahoma" pitchFamily="34" charset="0"/>
+                          <a:ea typeface="Tahoma" pitchFamily="34" charset="0"/>
+                          <a:cs typeface="Tahoma" pitchFamily="34" charset="0"/>
+                        </a:rPr>
+                        <a:t>7</a:t>
+                      </a:r>
+                      <a:endParaRPr lang="en-US" sz="1200" b="0" i="0" u="none" strike="noStrike">
+                        <a:solidFill>
+                          <a:srgbClr val="000000"/>
+                        </a:solidFill>
+                        <a:effectLst/>
+                        <a:latin typeface="Tahoma" pitchFamily="34" charset="0"/>
+                        <a:ea typeface="Tahoma" pitchFamily="34" charset="0"/>
+                        <a:cs typeface="Tahoma" pitchFamily="34" charset="0"/>
+                      </a:endParaRPr>
+                    </a:p>
+                  </a:txBody>
+                  <a:tcPr marL="5829" marR="5829" marT="5829" marB="0"/>
+                </a:tc>
+                <a:tc>
+                  <a:txBody>
+                    <a:bodyPr/>
+                    <a:lstStyle/>
+                    <a:p>
+                      <a:pPr algn="l" fontAlgn="t"/>
+                      <a:r>
+                        <a:rPr lang="en-US" sz="1200" u="none" strike="noStrike">
+                          <a:effectLst/>
+                          <a:latin typeface="Tahoma" pitchFamily="34" charset="0"/>
+                          <a:ea typeface="Tahoma" pitchFamily="34" charset="0"/>
+                          <a:cs typeface="Tahoma" pitchFamily="34" charset="0"/>
+                        </a:rPr>
+                        <a:t>Architecture is infeasible</a:t>
+                      </a:r>
+                      <a:endParaRPr lang="en-US" sz="1200" b="0" i="0" u="none" strike="noStrike">
+                        <a:solidFill>
+                          <a:srgbClr val="000000"/>
+                        </a:solidFill>
+                        <a:effectLst/>
+                        <a:latin typeface="Tahoma" pitchFamily="34" charset="0"/>
+                        <a:ea typeface="Tahoma" pitchFamily="34" charset="0"/>
+                        <a:cs typeface="Tahoma" pitchFamily="34" charset="0"/>
+                      </a:endParaRPr>
+                    </a:p>
+                  </a:txBody>
+                  <a:tcPr marL="5829" marR="5829" marT="5829" marB="0"/>
+                </a:tc>
+                <a:tc>
+                  <a:txBody>
+                    <a:bodyPr/>
+                    <a:lstStyle/>
+                    <a:p>
+                      <a:pPr algn="l" fontAlgn="t"/>
+                      <a:r>
+                        <a:rPr lang="en-US" sz="1200" u="none" strike="noStrike">
+                          <a:effectLst/>
+                          <a:latin typeface="Tahoma" pitchFamily="34" charset="0"/>
+                          <a:ea typeface="Tahoma" pitchFamily="34" charset="0"/>
+                          <a:cs typeface="Tahoma" pitchFamily="34" charset="0"/>
+                        </a:rPr>
+                        <a:t>Research and collect advices from professor</a:t>
+                      </a:r>
+                      <a:endParaRPr lang="en-US" sz="1200" b="0" i="0" u="none" strike="noStrike">
+                        <a:solidFill>
+                          <a:srgbClr val="000000"/>
+                        </a:solidFill>
+                        <a:effectLst/>
+                        <a:latin typeface="Tahoma" pitchFamily="34" charset="0"/>
+                        <a:ea typeface="Tahoma" pitchFamily="34" charset="0"/>
+                        <a:cs typeface="Tahoma" pitchFamily="34" charset="0"/>
+                      </a:endParaRPr>
+                    </a:p>
+                  </a:txBody>
+                  <a:tcPr marL="5829" marR="5829" marT="5829" marB="0"/>
+                </a:tc>
+                <a:tc>
+                  <a:txBody>
+                    <a:bodyPr/>
+                    <a:lstStyle/>
+                    <a:p>
+                      <a:pPr algn="l" fontAlgn="t"/>
+                      <a:r>
+                        <a:rPr lang="en-US" sz="1200" u="none" strike="noStrike">
+                          <a:effectLst/>
+                          <a:latin typeface="Tahoma" pitchFamily="34" charset="0"/>
+                          <a:ea typeface="Tahoma" pitchFamily="34" charset="0"/>
+                          <a:cs typeface="Tahoma" pitchFamily="34" charset="0"/>
+                        </a:rPr>
+                        <a:t>Active</a:t>
+                      </a:r>
+                      <a:endParaRPr lang="en-US" sz="1200" b="0" i="0" u="none" strike="noStrike">
+                        <a:solidFill>
+                          <a:srgbClr val="000000"/>
+                        </a:solidFill>
+                        <a:effectLst/>
+                        <a:latin typeface="Tahoma" pitchFamily="34" charset="0"/>
+                        <a:ea typeface="Tahoma" pitchFamily="34" charset="0"/>
+                        <a:cs typeface="Tahoma" pitchFamily="34" charset="0"/>
+                      </a:endParaRPr>
+                    </a:p>
+                  </a:txBody>
+                  <a:tcPr marL="5829" marR="5829" marT="5829" marB="0"/>
+                </a:tc>
+                <a:tc>
+                  <a:txBody>
+                    <a:bodyPr/>
+                    <a:lstStyle/>
+                    <a:p>
+                      <a:pPr algn="l" fontAlgn="t"/>
+                      <a:r>
+                        <a:rPr lang="en-US" sz="1200" u="none" strike="noStrike">
+                          <a:effectLst/>
+                          <a:latin typeface="Tahoma" pitchFamily="34" charset="0"/>
+                          <a:ea typeface="Tahoma" pitchFamily="34" charset="0"/>
+                          <a:cs typeface="Tahoma" pitchFamily="34" charset="0"/>
+                        </a:rPr>
+                        <a:t>N/A</a:t>
+                      </a:r>
+                      <a:endParaRPr lang="en-US" sz="1200" b="0" i="0" u="none" strike="noStrike">
+                        <a:solidFill>
+                          <a:srgbClr val="000000"/>
+                        </a:solidFill>
+                        <a:effectLst/>
+                        <a:latin typeface="Tahoma" pitchFamily="34" charset="0"/>
+                        <a:ea typeface="Tahoma" pitchFamily="34" charset="0"/>
+                        <a:cs typeface="Tahoma" pitchFamily="34" charset="0"/>
+                      </a:endParaRPr>
+                    </a:p>
+                  </a:txBody>
+                  <a:tcPr marL="5829" marR="5829" marT="5829" marB="0"/>
+                </a:tc>
+                <a:tc>
+                  <a:txBody>
+                    <a:bodyPr/>
+                    <a:lstStyle/>
+                    <a:p>
+                      <a:pPr algn="l" fontAlgn="t"/>
+                      <a:r>
+                        <a:rPr lang="en-US" sz="1200" u="none" strike="noStrike">
+                          <a:effectLst/>
+                          <a:latin typeface="Tahoma" pitchFamily="34" charset="0"/>
+                          <a:ea typeface="Tahoma" pitchFamily="34" charset="0"/>
+                          <a:cs typeface="Tahoma" pitchFamily="34" charset="0"/>
+                        </a:rPr>
+                        <a:t>- Need to learn the method of estimating</a:t>
+                      </a:r>
+                      <a:br>
+                        <a:rPr lang="en-US" sz="1200" u="none" strike="noStrike">
+                          <a:effectLst/>
+                          <a:latin typeface="Tahoma" pitchFamily="34" charset="0"/>
+                          <a:ea typeface="Tahoma" pitchFamily="34" charset="0"/>
+                          <a:cs typeface="Tahoma" pitchFamily="34" charset="0"/>
+                        </a:rPr>
+                      </a:br>
+                      <a:r>
+                        <a:rPr lang="en-US" sz="1200" u="none" strike="noStrike">
+                          <a:effectLst/>
+                          <a:latin typeface="Tahoma" pitchFamily="34" charset="0"/>
+                          <a:ea typeface="Tahoma" pitchFamily="34" charset="0"/>
+                          <a:cs typeface="Tahoma" pitchFamily="34" charset="0"/>
+                        </a:rPr>
+                        <a:t>- Build base on Quality Attributes</a:t>
+                      </a:r>
+                      <a:endParaRPr lang="en-US" sz="1200" b="0" i="0" u="none" strike="noStrike">
+                        <a:solidFill>
+                          <a:srgbClr val="000000"/>
+                        </a:solidFill>
+                        <a:effectLst/>
+                        <a:latin typeface="Tahoma" pitchFamily="34" charset="0"/>
+                        <a:ea typeface="Tahoma" pitchFamily="34" charset="0"/>
+                        <a:cs typeface="Tahoma" pitchFamily="34" charset="0"/>
+                      </a:endParaRPr>
+                    </a:p>
+                  </a:txBody>
+                  <a:tcPr marL="5829" marR="5829" marT="5829" marB="0"/>
+                </a:tc>
+              </a:tr>
+              <a:tr h="363315">
+                <a:tc>
+                  <a:txBody>
+                    <a:bodyPr/>
+                    <a:lstStyle/>
+                    <a:p>
+                      <a:pPr algn="l" fontAlgn="t"/>
+                      <a:r>
+                        <a:rPr lang="en-US" sz="1200" u="none" strike="noStrike">
+                          <a:effectLst/>
+                          <a:latin typeface="Tahoma" pitchFamily="34" charset="0"/>
+                          <a:ea typeface="Tahoma" pitchFamily="34" charset="0"/>
+                          <a:cs typeface="Tahoma" pitchFamily="34" charset="0"/>
+                        </a:rPr>
+                        <a:t>8</a:t>
+                      </a:r>
+                      <a:endParaRPr lang="en-US" sz="1200" b="0" i="0" u="none" strike="noStrike">
+                        <a:solidFill>
+                          <a:srgbClr val="000000"/>
+                        </a:solidFill>
+                        <a:effectLst/>
+                        <a:latin typeface="Tahoma" pitchFamily="34" charset="0"/>
+                        <a:ea typeface="Tahoma" pitchFamily="34" charset="0"/>
+                        <a:cs typeface="Tahoma" pitchFamily="34" charset="0"/>
+                      </a:endParaRPr>
+                    </a:p>
+                  </a:txBody>
+                  <a:tcPr marL="5829" marR="5829" marT="5829" marB="0"/>
+                </a:tc>
+                <a:tc>
+                  <a:txBody>
+                    <a:bodyPr/>
+                    <a:lstStyle/>
+                    <a:p>
+                      <a:pPr algn="l" fontAlgn="t"/>
+                      <a:r>
+                        <a:rPr lang="en-US" sz="1200" u="none" strike="noStrike">
+                          <a:effectLst/>
+                          <a:latin typeface="Tahoma" pitchFamily="34" charset="0"/>
+                          <a:ea typeface="Tahoma" pitchFamily="34" charset="0"/>
+                          <a:cs typeface="Tahoma" pitchFamily="34" charset="0"/>
+                        </a:rPr>
+                        <a:t>Delays to training impact the project</a:t>
+                      </a:r>
+                      <a:endParaRPr lang="en-US" sz="1200" b="0" i="0" u="none" strike="noStrike">
+                        <a:solidFill>
+                          <a:srgbClr val="000000"/>
+                        </a:solidFill>
+                        <a:effectLst/>
+                        <a:latin typeface="Tahoma" pitchFamily="34" charset="0"/>
+                        <a:ea typeface="Tahoma" pitchFamily="34" charset="0"/>
+                        <a:cs typeface="Tahoma" pitchFamily="34" charset="0"/>
+                      </a:endParaRPr>
+                    </a:p>
+                  </a:txBody>
+                  <a:tcPr marL="5829" marR="5829" marT="5829" marB="0"/>
+                </a:tc>
+                <a:tc>
+                  <a:txBody>
+                    <a:bodyPr/>
+                    <a:lstStyle/>
+                    <a:p>
+                      <a:pPr algn="l" fontAlgn="t"/>
+                      <a:r>
+                        <a:rPr lang="en-US" sz="1200" u="none" strike="noStrike">
+                          <a:effectLst/>
+                          <a:latin typeface="Tahoma" pitchFamily="34" charset="0"/>
+                          <a:ea typeface="Tahoma" pitchFamily="34" charset="0"/>
+                          <a:cs typeface="Tahoma" pitchFamily="34" charset="0"/>
+                        </a:rPr>
+                        <a:t>Increase effort for all members.</a:t>
+                      </a:r>
+                      <a:endParaRPr lang="en-US" sz="1200" b="0" i="0" u="none" strike="noStrike">
+                        <a:solidFill>
+                          <a:srgbClr val="000000"/>
+                        </a:solidFill>
+                        <a:effectLst/>
+                        <a:latin typeface="Tahoma" pitchFamily="34" charset="0"/>
+                        <a:ea typeface="Tahoma" pitchFamily="34" charset="0"/>
+                        <a:cs typeface="Tahoma" pitchFamily="34" charset="0"/>
+                      </a:endParaRPr>
+                    </a:p>
+                  </a:txBody>
+                  <a:tcPr marL="5829" marR="5829" marT="5829" marB="0"/>
+                </a:tc>
+                <a:tc>
+                  <a:txBody>
+                    <a:bodyPr/>
+                    <a:lstStyle/>
+                    <a:p>
+                      <a:pPr algn="l" fontAlgn="t"/>
+                      <a:r>
+                        <a:rPr lang="en-US" sz="1200" u="none" strike="noStrike">
+                          <a:effectLst/>
+                          <a:latin typeface="Tahoma" pitchFamily="34" charset="0"/>
+                          <a:ea typeface="Tahoma" pitchFamily="34" charset="0"/>
+                          <a:cs typeface="Tahoma" pitchFamily="34" charset="0"/>
+                        </a:rPr>
+                        <a:t>Active</a:t>
+                      </a:r>
+                      <a:endParaRPr lang="en-US" sz="1200" b="0" i="0" u="none" strike="noStrike">
+                        <a:solidFill>
+                          <a:srgbClr val="000000"/>
+                        </a:solidFill>
+                        <a:effectLst/>
+                        <a:latin typeface="Tahoma" pitchFamily="34" charset="0"/>
+                        <a:ea typeface="Tahoma" pitchFamily="34" charset="0"/>
+                        <a:cs typeface="Tahoma" pitchFamily="34" charset="0"/>
+                      </a:endParaRPr>
+                    </a:p>
+                  </a:txBody>
+                  <a:tcPr marL="5829" marR="5829" marT="5829" marB="0"/>
+                </a:tc>
+                <a:tc>
+                  <a:txBody>
+                    <a:bodyPr/>
+                    <a:lstStyle/>
+                    <a:p>
+                      <a:pPr algn="l" fontAlgn="t"/>
+                      <a:r>
+                        <a:rPr lang="en-US" sz="1200" u="none" strike="noStrike">
+                          <a:effectLst/>
+                          <a:latin typeface="Tahoma" pitchFamily="34" charset="0"/>
+                          <a:ea typeface="Tahoma" pitchFamily="34" charset="0"/>
+                          <a:cs typeface="Tahoma" pitchFamily="34" charset="0"/>
+                        </a:rPr>
+                        <a:t>N/A</a:t>
+                      </a:r>
+                      <a:endParaRPr lang="en-US" sz="1200" b="0" i="0" u="none" strike="noStrike">
+                        <a:solidFill>
+                          <a:srgbClr val="000000"/>
+                        </a:solidFill>
+                        <a:effectLst/>
+                        <a:latin typeface="Tahoma" pitchFamily="34" charset="0"/>
+                        <a:ea typeface="Tahoma" pitchFamily="34" charset="0"/>
+                        <a:cs typeface="Tahoma" pitchFamily="34" charset="0"/>
+                      </a:endParaRPr>
+                    </a:p>
+                  </a:txBody>
+                  <a:tcPr marL="5829" marR="5829" marT="5829" marB="0"/>
+                </a:tc>
+                <a:tc>
+                  <a:txBody>
+                    <a:bodyPr/>
+                    <a:lstStyle/>
+                    <a:p>
+                      <a:pPr algn="l" fontAlgn="t"/>
+                      <a:r>
+                        <a:rPr lang="en-US" sz="1200" u="none" strike="noStrike">
+                          <a:effectLst/>
+                          <a:latin typeface="Tahoma" pitchFamily="34" charset="0"/>
+                          <a:ea typeface="Tahoma" pitchFamily="34" charset="0"/>
+                          <a:cs typeface="Tahoma" pitchFamily="34" charset="0"/>
+                        </a:rPr>
+                        <a:t>- Need to trainning at beginning</a:t>
+                      </a:r>
+                      <a:endParaRPr lang="en-US" sz="1200" b="0" i="0" u="none" strike="noStrike">
+                        <a:solidFill>
+                          <a:srgbClr val="000000"/>
+                        </a:solidFill>
+                        <a:effectLst/>
+                        <a:latin typeface="Tahoma" pitchFamily="34" charset="0"/>
+                        <a:ea typeface="Tahoma" pitchFamily="34" charset="0"/>
+                        <a:cs typeface="Tahoma" pitchFamily="34" charset="0"/>
+                      </a:endParaRPr>
+                    </a:p>
+                  </a:txBody>
+                  <a:tcPr marL="5829" marR="5829" marT="5829" marB="0"/>
+                </a:tc>
+              </a:tr>
+              <a:tr h="726630">
+                <a:tc>
+                  <a:txBody>
+                    <a:bodyPr/>
+                    <a:lstStyle/>
+                    <a:p>
+                      <a:pPr algn="l" fontAlgn="t"/>
+                      <a:r>
+                        <a:rPr lang="en-US" sz="1200" u="none" strike="noStrike">
+                          <a:effectLst/>
+                          <a:latin typeface="Tahoma" pitchFamily="34" charset="0"/>
+                          <a:ea typeface="Tahoma" pitchFamily="34" charset="0"/>
+                          <a:cs typeface="Tahoma" pitchFamily="34" charset="0"/>
+                        </a:rPr>
+                        <a:t>9</a:t>
+                      </a:r>
+                      <a:endParaRPr lang="en-US" sz="1200" b="0" i="0" u="none" strike="noStrike">
+                        <a:solidFill>
+                          <a:srgbClr val="000000"/>
+                        </a:solidFill>
+                        <a:effectLst/>
+                        <a:latin typeface="Tahoma" pitchFamily="34" charset="0"/>
+                        <a:ea typeface="Tahoma" pitchFamily="34" charset="0"/>
+                        <a:cs typeface="Tahoma" pitchFamily="34" charset="0"/>
+                      </a:endParaRPr>
+                    </a:p>
+                  </a:txBody>
+                  <a:tcPr marL="5829" marR="5829" marT="5829" marB="0"/>
+                </a:tc>
+                <a:tc>
+                  <a:txBody>
+                    <a:bodyPr/>
+                    <a:lstStyle/>
+                    <a:p>
+                      <a:pPr algn="l" fontAlgn="t"/>
+                      <a:r>
+                        <a:rPr lang="en-US" sz="1200" u="none" strike="noStrike">
+                          <a:effectLst/>
+                          <a:latin typeface="Tahoma" pitchFamily="34" charset="0"/>
+                          <a:ea typeface="Tahoma" pitchFamily="34" charset="0"/>
+                          <a:cs typeface="Tahoma" pitchFamily="34" charset="0"/>
+                        </a:rPr>
+                        <a:t>Customer rejects the prototype</a:t>
+                      </a:r>
+                      <a:endParaRPr lang="en-US" sz="1200" b="0" i="0" u="none" strike="noStrike">
+                        <a:solidFill>
+                          <a:srgbClr val="000000"/>
+                        </a:solidFill>
+                        <a:effectLst/>
+                        <a:latin typeface="Tahoma" pitchFamily="34" charset="0"/>
+                        <a:ea typeface="Tahoma" pitchFamily="34" charset="0"/>
+                        <a:cs typeface="Tahoma" pitchFamily="34" charset="0"/>
+                      </a:endParaRPr>
+                    </a:p>
+                  </a:txBody>
+                  <a:tcPr marL="5829" marR="5829" marT="5829" marB="0"/>
+                </a:tc>
+                <a:tc>
+                  <a:txBody>
+                    <a:bodyPr/>
+                    <a:lstStyle/>
+                    <a:p>
+                      <a:pPr algn="l" fontAlgn="t"/>
+                      <a:r>
+                        <a:rPr lang="en-US" sz="1200" u="none" strike="noStrike">
+                          <a:effectLst/>
+                          <a:latin typeface="Tahoma" pitchFamily="34" charset="0"/>
+                          <a:ea typeface="Tahoma" pitchFamily="34" charset="0"/>
+                          <a:cs typeface="Tahoma" pitchFamily="34" charset="0"/>
+                        </a:rPr>
+                        <a:t>Request some prototypes of others website to customer, re-design follow the choice of customer.</a:t>
+                      </a:r>
+                      <a:endParaRPr lang="en-US" sz="1200" b="0" i="0" u="none" strike="noStrike">
+                        <a:solidFill>
+                          <a:srgbClr val="000000"/>
+                        </a:solidFill>
+                        <a:effectLst/>
+                        <a:latin typeface="Tahoma" pitchFamily="34" charset="0"/>
+                        <a:ea typeface="Tahoma" pitchFamily="34" charset="0"/>
+                        <a:cs typeface="Tahoma" pitchFamily="34" charset="0"/>
+                      </a:endParaRPr>
+                    </a:p>
+                  </a:txBody>
+                  <a:tcPr marL="5829" marR="5829" marT="5829" marB="0"/>
+                </a:tc>
+                <a:tc>
+                  <a:txBody>
+                    <a:bodyPr/>
+                    <a:lstStyle/>
+                    <a:p>
+                      <a:pPr algn="l" fontAlgn="t"/>
+                      <a:r>
+                        <a:rPr lang="en-US" sz="1200" u="none" strike="noStrike">
+                          <a:effectLst/>
+                          <a:latin typeface="Tahoma" pitchFamily="34" charset="0"/>
+                          <a:ea typeface="Tahoma" pitchFamily="34" charset="0"/>
+                          <a:cs typeface="Tahoma" pitchFamily="34" charset="0"/>
+                        </a:rPr>
+                        <a:t>Active</a:t>
+                      </a:r>
+                      <a:endParaRPr lang="en-US" sz="1200" b="0" i="0" u="none" strike="noStrike">
+                        <a:solidFill>
+                          <a:srgbClr val="000000"/>
+                        </a:solidFill>
+                        <a:effectLst/>
+                        <a:latin typeface="Tahoma" pitchFamily="34" charset="0"/>
+                        <a:ea typeface="Tahoma" pitchFamily="34" charset="0"/>
+                        <a:cs typeface="Tahoma" pitchFamily="34" charset="0"/>
+                      </a:endParaRPr>
+                    </a:p>
+                  </a:txBody>
+                  <a:tcPr marL="5829" marR="5829" marT="5829" marB="0"/>
+                </a:tc>
+                <a:tc>
+                  <a:txBody>
+                    <a:bodyPr/>
+                    <a:lstStyle/>
+                    <a:p>
+                      <a:pPr algn="l" fontAlgn="t"/>
+                      <a:r>
+                        <a:rPr lang="en-US" sz="1200" u="none" strike="noStrike">
+                          <a:effectLst/>
+                          <a:latin typeface="Tahoma" pitchFamily="34" charset="0"/>
+                          <a:ea typeface="Tahoma" pitchFamily="34" charset="0"/>
+                          <a:cs typeface="Tahoma" pitchFamily="34" charset="0"/>
+                        </a:rPr>
+                        <a:t>N/A</a:t>
+                      </a:r>
+                      <a:endParaRPr lang="en-US" sz="1200" b="0" i="0" u="none" strike="noStrike">
+                        <a:solidFill>
+                          <a:srgbClr val="000000"/>
+                        </a:solidFill>
+                        <a:effectLst/>
+                        <a:latin typeface="Tahoma" pitchFamily="34" charset="0"/>
+                        <a:ea typeface="Tahoma" pitchFamily="34" charset="0"/>
+                        <a:cs typeface="Tahoma" pitchFamily="34" charset="0"/>
+                      </a:endParaRPr>
+                    </a:p>
+                  </a:txBody>
+                  <a:tcPr marL="5829" marR="5829" marT="5829" marB="0"/>
+                </a:tc>
+                <a:tc>
+                  <a:txBody>
+                    <a:bodyPr/>
+                    <a:lstStyle/>
+                    <a:p>
+                      <a:pPr algn="l" fontAlgn="t"/>
+                      <a:r>
+                        <a:rPr lang="en-US" sz="1200" u="none" strike="noStrike" dirty="0">
+                          <a:effectLst/>
+                          <a:latin typeface="Tahoma" pitchFamily="34" charset="0"/>
+                          <a:ea typeface="Tahoma" pitchFamily="34" charset="0"/>
+                          <a:cs typeface="Tahoma" pitchFamily="34" charset="0"/>
+                        </a:rPr>
+                        <a:t>- Need understand clearly about requirement of customer</a:t>
+                      </a:r>
+                      <a:endParaRPr lang="en-US" sz="1200" b="0" i="0" u="none" strike="noStrike" dirty="0">
+                        <a:solidFill>
+                          <a:srgbClr val="000000"/>
+                        </a:solidFill>
+                        <a:effectLst/>
+                        <a:latin typeface="Tahoma" pitchFamily="34" charset="0"/>
+                        <a:ea typeface="Tahoma" pitchFamily="34" charset="0"/>
+                        <a:cs typeface="Tahoma" pitchFamily="34" charset="0"/>
+                      </a:endParaRPr>
+                    </a:p>
+                  </a:txBody>
+                  <a:tcPr marL="5829" marR="5829" marT="5829" marB="0"/>
+                </a:tc>
+              </a:tr>
+            </a:tbl>
+          </a:graphicData>
+        </a:graphic>
+      </p:graphicFrame>
       <p:sp>
         <p:nvSpPr>
           <p:cNvPr id="4" name="Slide Number Placeholder 3"/>
@@ -15926,7 +17488,7 @@
           <a:p>
             <a:fld id="{703E83EE-B7BB-4A1D-A775-A1100B928FF1}" type="slidenum">
               <a:rPr lang="vi-VN" smtClean="0"/>
-              <a:t>24</a:t>
+              <a:t>23</a:t>
             </a:fld>
             <a:endParaRPr lang="vi-VN"/>
           </a:p>
@@ -15945,10 +17507,17 @@
   <p:transition spd="slow">
     <p:cover/>
   </p:transition>
+  <p:timing>
+    <p:tnLst>
+      <p:par>
+        <p:cTn id="1" dur="indefinite" restart="never" nodeType="tmRoot"/>
+      </p:par>
+    </p:tnLst>
+  </p:timing>
 </p:sld>
 </file>
 
-<file path=ppt/slides/slide25.xml><?xml version="1.0" encoding="utf-8"?>
+<file path=ppt/slides/slide24.xml><?xml version="1.0" encoding="utf-8"?>
 <p:sld xmlns:a="http://schemas.openxmlformats.org/drawingml/2006/main" xmlns:r="http://schemas.openxmlformats.org/officeDocument/2006/relationships" xmlns:p="http://schemas.openxmlformats.org/presentationml/2006/main">
   <p:cSld>
     <p:spTree>
@@ -16055,7 +17624,7 @@
                 <a:ea typeface="Tahoma" panose="020B0604030504040204" pitchFamily="34" charset="0"/>
                 <a:cs typeface="Tahoma" panose="020B0604030504040204" pitchFamily="34" charset="0"/>
               </a:rPr>
-              <a:t>25</a:t>
+              <a:t>24</a:t>
             </a:fld>
             <a:endParaRPr lang="vi-VN">
               <a:latin typeface="Tahoma" panose="020B0604030504040204" pitchFamily="34" charset="0"/>
@@ -16078,6 +17647,13 @@
   <p:transition spd="slow">
     <p:cover/>
   </p:transition>
+  <p:timing>
+    <p:tnLst>
+      <p:par>
+        <p:cTn id="1" dur="indefinite" restart="never" nodeType="tmRoot"/>
+      </p:par>
+    </p:tnLst>
+  </p:timing>
 </p:sld>
 </file>
 
@@ -17348,7 +18924,7 @@
     </a:clrScheme>
     <a:fontScheme name="Office">
       <a:majorFont>
-        <a:latin typeface="Calibri Light" panose="020F0302020204030204"/>
+        <a:latin typeface="Calibri Light"/>
         <a:ea typeface=""/>
         <a:cs typeface=""/>
         <a:font script="Jpan" typeface="游ゴシック Light"/>
@@ -17400,7 +18976,7 @@
         <a:font script="Tfng" typeface="Ebrima"/>
       </a:majorFont>
       <a:minorFont>
-        <a:latin typeface="Calibri" panose="020F0502020204030204"/>
+        <a:latin typeface="Calibri"/>
         <a:ea typeface=""/>
         <a:cs typeface=""/>
         <a:font script="Jpan" typeface="游ゴシック"/>
@@ -17594,7 +19170,7 @@
   <a:extraClrSchemeLst/>
   <a:extLst>
     <a:ext uri="{05A4C25C-085E-4340-85A3-A5531E510DB2}">
-      <thm15:themeFamily xmlns:thm15="http://schemas.microsoft.com/office/thememl/2012/main" name="Office Theme" id="{62F939B6-93AF-4DB8-9C6B-D6C7DFDC589F}" vid="{4A3C46E8-61CC-4603-A589-7422A47A8E4A}"/>
+      <thm15:themeFamily xmlns:thm15="http://schemas.microsoft.com/office/thememl/2012/main" xmlns="" name="Office Theme" id="{62F939B6-93AF-4DB8-9C6B-D6C7DFDC589F}" vid="{4A3C46E8-61CC-4603-A589-7422A47A8E4A}"/>
     </a:ext>
   </a:extLst>
 </a:theme>
@@ -17643,7 +19219,7 @@
     </a:clrScheme>
     <a:fontScheme name="Office">
       <a:majorFont>
-        <a:latin typeface="Calibri Light" panose="020F0302020204030204"/>
+        <a:latin typeface="Calibri Light"/>
         <a:ea typeface=""/>
         <a:cs typeface=""/>
         <a:font script="Jpan" typeface="游ゴシック Light"/>
@@ -17695,7 +19271,7 @@
         <a:font script="Tfng" typeface="Ebrima"/>
       </a:majorFont>
       <a:minorFont>
-        <a:latin typeface="Calibri" panose="020F0502020204030204"/>
+        <a:latin typeface="Calibri"/>
         <a:ea typeface=""/>
         <a:cs typeface=""/>
         <a:font script="Jpan" typeface="游ゴシック"/>
@@ -17889,7 +19465,7 @@
   <a:extraClrSchemeLst/>
   <a:extLst>
     <a:ext uri="{05A4C25C-085E-4340-85A3-A5531E510DB2}">
-      <thm15:themeFamily xmlns:thm15="http://schemas.microsoft.com/office/thememl/2012/main" name="Office Theme" id="{62F939B6-93AF-4DB8-9C6B-D6C7DFDC589F}" vid="{4A3C46E8-61CC-4603-A589-7422A47A8E4A}"/>
+      <thm15:themeFamily xmlns:thm15="http://schemas.microsoft.com/office/thememl/2012/main" xmlns="" name="Office Theme" id="{62F939B6-93AF-4DB8-9C6B-D6C7DFDC589F}" vid="{4A3C46E8-61CC-4603-A589-7422A47A8E4A}"/>
     </a:ext>
   </a:extLst>
 </a:theme>

</xml_diff>